<commit_message>
added new version of figure, rewrote auto_threshold.png
</commit_message>
<xml_diff>
--- a/figures/resources/auto_threshold.pptx
+++ b/figures/resources/auto_threshold.pptx
@@ -7,6 +7,7 @@
   <p:sldIdLst>
     <p:sldId id="256" r:id="rId2"/>
     <p:sldId id="257" r:id="rId3"/>
+    <p:sldId id="258" r:id="rId4"/>
   </p:sldIdLst>
   <p:sldSz cx="12192000" cy="6858000"/>
   <p:notesSz cx="6858000" cy="9144000"/>
@@ -105,6 +106,11 @@
       </a:defRPr>
     </a:lvl9pPr>
   </p:defaultTextStyle>
+  <p:extLst>
+    <p:ext uri="{EFAFB233-063F-42B5-8137-9DF3F51BA10A}">
+      <p15:sldGuideLst xmlns:p15="http://schemas.microsoft.com/office/powerpoint/2012/main"/>
+    </p:ext>
+  </p:extLst>
 </p:presentation>
 </file>
 
@@ -257,7 +263,7 @@
           <a:p>
             <a:fld id="{A2082E80-D984-8849-B81C-39C6BF0D230A}" type="datetimeFigureOut">
               <a:rPr lang="de-DE" smtClean="0"/>
-              <a:t>07.03.22</a:t>
+              <a:t>08.03.2022</a:t>
             </a:fld>
             <a:endParaRPr lang="de-DE"/>
           </a:p>
@@ -457,7 +463,7 @@
           <a:p>
             <a:fld id="{A2082E80-D984-8849-B81C-39C6BF0D230A}" type="datetimeFigureOut">
               <a:rPr lang="de-DE" smtClean="0"/>
-              <a:t>07.03.22</a:t>
+              <a:t>08.03.2022</a:t>
             </a:fld>
             <a:endParaRPr lang="de-DE"/>
           </a:p>
@@ -667,7 +673,7 @@
           <a:p>
             <a:fld id="{A2082E80-D984-8849-B81C-39C6BF0D230A}" type="datetimeFigureOut">
               <a:rPr lang="de-DE" smtClean="0"/>
-              <a:t>07.03.22</a:t>
+              <a:t>08.03.2022</a:t>
             </a:fld>
             <a:endParaRPr lang="de-DE"/>
           </a:p>
@@ -867,7 +873,7 @@
           <a:p>
             <a:fld id="{A2082E80-D984-8849-B81C-39C6BF0D230A}" type="datetimeFigureOut">
               <a:rPr lang="de-DE" smtClean="0"/>
-              <a:t>07.03.22</a:t>
+              <a:t>08.03.2022</a:t>
             </a:fld>
             <a:endParaRPr lang="de-DE"/>
           </a:p>
@@ -1143,7 +1149,7 @@
           <a:p>
             <a:fld id="{A2082E80-D984-8849-B81C-39C6BF0D230A}" type="datetimeFigureOut">
               <a:rPr lang="de-DE" smtClean="0"/>
-              <a:t>07.03.22</a:t>
+              <a:t>08.03.2022</a:t>
             </a:fld>
             <a:endParaRPr lang="de-DE"/>
           </a:p>
@@ -1411,7 +1417,7 @@
           <a:p>
             <a:fld id="{A2082E80-D984-8849-B81C-39C6BF0D230A}" type="datetimeFigureOut">
               <a:rPr lang="de-DE" smtClean="0"/>
-              <a:t>07.03.22</a:t>
+              <a:t>08.03.2022</a:t>
             </a:fld>
             <a:endParaRPr lang="de-DE"/>
           </a:p>
@@ -1826,7 +1832,7 @@
           <a:p>
             <a:fld id="{A2082E80-D984-8849-B81C-39C6BF0D230A}" type="datetimeFigureOut">
               <a:rPr lang="de-DE" smtClean="0"/>
-              <a:t>07.03.22</a:t>
+              <a:t>08.03.2022</a:t>
             </a:fld>
             <a:endParaRPr lang="de-DE"/>
           </a:p>
@@ -1968,7 +1974,7 @@
           <a:p>
             <a:fld id="{A2082E80-D984-8849-B81C-39C6BF0D230A}" type="datetimeFigureOut">
               <a:rPr lang="de-DE" smtClean="0"/>
-              <a:t>07.03.22</a:t>
+              <a:t>08.03.2022</a:t>
             </a:fld>
             <a:endParaRPr lang="de-DE"/>
           </a:p>
@@ -2081,7 +2087,7 @@
           <a:p>
             <a:fld id="{A2082E80-D984-8849-B81C-39C6BF0D230A}" type="datetimeFigureOut">
               <a:rPr lang="de-DE" smtClean="0"/>
-              <a:t>07.03.22</a:t>
+              <a:t>08.03.2022</a:t>
             </a:fld>
             <a:endParaRPr lang="de-DE"/>
           </a:p>
@@ -2394,7 +2400,7 @@
           <a:p>
             <a:fld id="{A2082E80-D984-8849-B81C-39C6BF0D230A}" type="datetimeFigureOut">
               <a:rPr lang="de-DE" smtClean="0"/>
-              <a:t>07.03.22</a:t>
+              <a:t>08.03.2022</a:t>
             </a:fld>
             <a:endParaRPr lang="de-DE"/>
           </a:p>
@@ -2683,7 +2689,7 @@
           <a:p>
             <a:fld id="{A2082E80-D984-8849-B81C-39C6BF0D230A}" type="datetimeFigureOut">
               <a:rPr lang="de-DE" smtClean="0"/>
-              <a:t>07.03.22</a:t>
+              <a:t>08.03.2022</a:t>
             </a:fld>
             <a:endParaRPr lang="de-DE"/>
           </a:p>
@@ -2926,7 +2932,7 @@
           <a:p>
             <a:fld id="{A2082E80-D984-8849-B81C-39C6BF0D230A}" type="datetimeFigureOut">
               <a:rPr lang="de-DE" smtClean="0"/>
-              <a:t>07.03.22</a:t>
+              <a:t>08.03.2022</a:t>
             </a:fld>
             <a:endParaRPr lang="de-DE"/>
           </a:p>
@@ -4645,6 +4651,1880 @@
 </p:sld>
 </file>
 
+<file path=ppt/slides/slide3.xml><?xml version="1.0" encoding="utf-8"?>
+<p:sld xmlns:a="http://schemas.openxmlformats.org/drawingml/2006/main" xmlns:r="http://schemas.openxmlformats.org/officeDocument/2006/relationships" xmlns:p="http://schemas.openxmlformats.org/presentationml/2006/main">
+  <p:cSld>
+    <p:spTree>
+      <p:nvGrpSpPr>
+        <p:cNvPr id="1" name=""/>
+        <p:cNvGrpSpPr/>
+        <p:nvPr/>
+      </p:nvGrpSpPr>
+      <p:grpSpPr>
+        <a:xfrm>
+          <a:off x="0" y="0"/>
+          <a:ext cx="0" cy="0"/>
+          <a:chOff x="0" y="0"/>
+          <a:chExt cx="0" cy="0"/>
+        </a:xfrm>
+      </p:grpSpPr>
+      <p:pic>
+        <p:nvPicPr>
+          <p:cNvPr id="4" name="Picture 3">
+            <a:extLst>
+              <a:ext uri="{FF2B5EF4-FFF2-40B4-BE49-F238E27FC236}">
+                <a16:creationId xmlns:a16="http://schemas.microsoft.com/office/drawing/2014/main" id="{15DD2D88-C847-F642-8820-A3C632BD4E4F}"/>
+              </a:ext>
+            </a:extLst>
+          </p:cNvPr>
+          <p:cNvPicPr>
+            <a:picLocks noChangeAspect="1"/>
+          </p:cNvPicPr>
+          <p:nvPr/>
+        </p:nvPicPr>
+        <p:blipFill>
+          <a:blip r:embed="rId2"/>
+          <a:stretch>
+            <a:fillRect/>
+          </a:stretch>
+        </p:blipFill>
+        <p:spPr>
+          <a:xfrm>
+            <a:off x="546660" y="3208734"/>
+            <a:ext cx="2502099" cy="938287"/>
+          </a:xfrm>
+          <a:prstGeom prst="rect">
+            <a:avLst/>
+          </a:prstGeom>
+        </p:spPr>
+      </p:pic>
+      <p:pic>
+        <p:nvPicPr>
+          <p:cNvPr id="5" name="Picture 4">
+            <a:extLst>
+              <a:ext uri="{FF2B5EF4-FFF2-40B4-BE49-F238E27FC236}">
+                <a16:creationId xmlns:a16="http://schemas.microsoft.com/office/drawing/2014/main" id="{CD280D81-DF66-4A49-A808-0820824C6A39}"/>
+              </a:ext>
+            </a:extLst>
+          </p:cNvPr>
+          <p:cNvPicPr>
+            <a:picLocks noChangeAspect="1"/>
+          </p:cNvPicPr>
+          <p:nvPr/>
+        </p:nvPicPr>
+        <p:blipFill>
+          <a:blip r:embed="rId3"/>
+          <a:stretch>
+            <a:fillRect/>
+          </a:stretch>
+        </p:blipFill>
+        <p:spPr>
+          <a:xfrm>
+            <a:off x="546660" y="1481037"/>
+            <a:ext cx="2502099" cy="938287"/>
+          </a:xfrm>
+          <a:prstGeom prst="rect">
+            <a:avLst/>
+          </a:prstGeom>
+        </p:spPr>
+      </p:pic>
+      <p:pic>
+        <p:nvPicPr>
+          <p:cNvPr id="6" name="Picture 5">
+            <a:extLst>
+              <a:ext uri="{FF2B5EF4-FFF2-40B4-BE49-F238E27FC236}">
+                <a16:creationId xmlns:a16="http://schemas.microsoft.com/office/drawing/2014/main" id="{ACFE80AA-4AA5-4F43-B539-1B37947725BC}"/>
+              </a:ext>
+            </a:extLst>
+          </p:cNvPr>
+          <p:cNvPicPr>
+            <a:picLocks noChangeAspect="1"/>
+          </p:cNvPicPr>
+          <p:nvPr/>
+        </p:nvPicPr>
+        <p:blipFill>
+          <a:blip r:embed="rId4"/>
+          <a:stretch>
+            <a:fillRect/>
+          </a:stretch>
+        </p:blipFill>
+        <p:spPr>
+          <a:xfrm>
+            <a:off x="546660" y="4955780"/>
+            <a:ext cx="2502099" cy="938287"/>
+          </a:xfrm>
+          <a:prstGeom prst="rect">
+            <a:avLst/>
+          </a:prstGeom>
+        </p:spPr>
+      </p:pic>
+      <p:sp>
+        <p:nvSpPr>
+          <p:cNvPr id="11" name="Rectangle 10">
+            <a:extLst>
+              <a:ext uri="{FF2B5EF4-FFF2-40B4-BE49-F238E27FC236}">
+                <a16:creationId xmlns:a16="http://schemas.microsoft.com/office/drawing/2014/main" id="{E552DB2A-8498-7641-8278-94712E00FC7F}"/>
+              </a:ext>
+            </a:extLst>
+          </p:cNvPr>
+          <p:cNvSpPr/>
+          <p:nvPr/>
+        </p:nvSpPr>
+        <p:spPr>
+          <a:xfrm>
+            <a:off x="13072791" y="1904827"/>
+            <a:ext cx="1360834" cy="3000821"/>
+          </a:xfrm>
+          <a:prstGeom prst="rect">
+            <a:avLst/>
+          </a:prstGeom>
+        </p:spPr>
+        <p:txBody>
+          <a:bodyPr wrap="square">
+            <a:spAutoFit/>
+          </a:bodyPr>
+          <a:lstStyle/>
+          <a:p>
+            <a:r>
+              <a:rPr lang="de-DE" sz="1050" dirty="0"/>
+              <a:t>xy_8bit__two_bright</a:t>
+            </a:r>
+          </a:p>
+          <a:p>
+            <a:r>
+              <a:rPr lang="de-DE" sz="1050" dirty="0"/>
+              <a:t>Default: 103</a:t>
+            </a:r>
+          </a:p>
+          <a:p>
+            <a:r>
+              <a:rPr lang="de-DE" sz="1050" b="1" dirty="0"/>
+              <a:t>Huang: 81</a:t>
+            </a:r>
+          </a:p>
+          <a:p>
+            <a:r>
+              <a:rPr lang="de-DE" sz="1050" dirty="0"/>
+              <a:t>Huang2: 86</a:t>
+            </a:r>
+          </a:p>
+          <a:p>
+            <a:r>
+              <a:rPr lang="de-DE" sz="1050" dirty="0" err="1"/>
+              <a:t>Intermodes</a:t>
+            </a:r>
+            <a:r>
+              <a:rPr lang="de-DE" sz="1050" dirty="0"/>
+              <a:t>: 110</a:t>
+            </a:r>
+          </a:p>
+          <a:p>
+            <a:r>
+              <a:rPr lang="de-DE" sz="1050" dirty="0" err="1"/>
+              <a:t>IsoData</a:t>
+            </a:r>
+            <a:r>
+              <a:rPr lang="de-DE" sz="1050" dirty="0"/>
+              <a:t>: 103</a:t>
+            </a:r>
+          </a:p>
+          <a:p>
+            <a:r>
+              <a:rPr lang="de-DE" sz="1050" dirty="0"/>
+              <a:t>Li: 64</a:t>
+            </a:r>
+          </a:p>
+          <a:p>
+            <a:r>
+              <a:rPr lang="de-DE" sz="1050" dirty="0" err="1"/>
+              <a:t>MaxEntropy</a:t>
+            </a:r>
+            <a:r>
+              <a:rPr lang="de-DE" sz="1050" dirty="0"/>
+              <a:t>: 49</a:t>
+            </a:r>
+          </a:p>
+          <a:p>
+            <a:r>
+              <a:rPr lang="de-DE" sz="1050" dirty="0" err="1"/>
+              <a:t>Mean</a:t>
+            </a:r>
+            <a:r>
+              <a:rPr lang="de-DE" sz="1050" dirty="0"/>
+              <a:t>: 62</a:t>
+            </a:r>
+          </a:p>
+          <a:p>
+            <a:r>
+              <a:rPr lang="de-DE" sz="1050" dirty="0" err="1"/>
+              <a:t>MinError</a:t>
+            </a:r>
+            <a:r>
+              <a:rPr lang="de-DE" sz="1050" dirty="0"/>
+              <a:t>(I): 23</a:t>
+            </a:r>
+          </a:p>
+          <a:p>
+            <a:r>
+              <a:rPr lang="de-DE" sz="1050" dirty="0"/>
+              <a:t>Minimum: 111</a:t>
+            </a:r>
+          </a:p>
+          <a:p>
+            <a:r>
+              <a:rPr lang="de-DE" sz="1050" dirty="0"/>
+              <a:t>Moments: 103</a:t>
+            </a:r>
+          </a:p>
+          <a:p>
+            <a:r>
+              <a:rPr lang="de-DE" sz="1050" b="1" dirty="0"/>
+              <a:t>Otsu: 103</a:t>
+            </a:r>
+          </a:p>
+          <a:p>
+            <a:r>
+              <a:rPr lang="de-DE" sz="1050" dirty="0" err="1"/>
+              <a:t>Percentile</a:t>
+            </a:r>
+            <a:r>
+              <a:rPr lang="de-DE" sz="1050" dirty="0"/>
+              <a:t>: 14</a:t>
+            </a:r>
+          </a:p>
+          <a:p>
+            <a:r>
+              <a:rPr lang="de-DE" sz="1050" dirty="0" err="1"/>
+              <a:t>RenyiEntropy</a:t>
+            </a:r>
+            <a:r>
+              <a:rPr lang="de-DE" sz="1050" dirty="0"/>
+              <a:t>: 45</a:t>
+            </a:r>
+          </a:p>
+          <a:p>
+            <a:r>
+              <a:rPr lang="de-DE" sz="1050" dirty="0" err="1"/>
+              <a:t>Shanbhag</a:t>
+            </a:r>
+            <a:r>
+              <a:rPr lang="de-DE" sz="1050" dirty="0"/>
+              <a:t>: 169</a:t>
+            </a:r>
+          </a:p>
+          <a:p>
+            <a:r>
+              <a:rPr lang="de-DE" sz="1050" dirty="0" err="1"/>
+              <a:t>Triangle</a:t>
+            </a:r>
+            <a:r>
+              <a:rPr lang="de-DE" sz="1050" dirty="0"/>
+              <a:t>: 30</a:t>
+            </a:r>
+          </a:p>
+          <a:p>
+            <a:r>
+              <a:rPr lang="de-DE" sz="1050" dirty="0"/>
+              <a:t>Yen: 23</a:t>
+            </a:r>
+          </a:p>
+        </p:txBody>
+      </p:sp>
+      <p:sp>
+        <p:nvSpPr>
+          <p:cNvPr id="12" name="Rectangle 11">
+            <a:extLst>
+              <a:ext uri="{FF2B5EF4-FFF2-40B4-BE49-F238E27FC236}">
+                <a16:creationId xmlns:a16="http://schemas.microsoft.com/office/drawing/2014/main" id="{E2107B69-0801-8442-82D0-1923A6122041}"/>
+              </a:ext>
+            </a:extLst>
+          </p:cNvPr>
+          <p:cNvSpPr/>
+          <p:nvPr/>
+        </p:nvSpPr>
+        <p:spPr>
+          <a:xfrm>
+            <a:off x="16203615" y="1904827"/>
+            <a:ext cx="1592195" cy="3000821"/>
+          </a:xfrm>
+          <a:prstGeom prst="rect">
+            <a:avLst/>
+          </a:prstGeom>
+        </p:spPr>
+        <p:txBody>
+          <a:bodyPr wrap="square">
+            <a:spAutoFit/>
+          </a:bodyPr>
+          <a:lstStyle/>
+          <a:p>
+            <a:r>
+              <a:rPr lang="de-DE" sz="1050" dirty="0"/>
+              <a:t>xy_8bit__just_noise</a:t>
+            </a:r>
+          </a:p>
+          <a:p>
+            <a:r>
+              <a:rPr lang="de-DE" sz="1050" dirty="0"/>
+              <a:t>Default: 9</a:t>
+            </a:r>
+          </a:p>
+          <a:p>
+            <a:r>
+              <a:rPr lang="de-DE" sz="1050" b="1" dirty="0"/>
+              <a:t>Huang: 9</a:t>
+            </a:r>
+          </a:p>
+          <a:p>
+            <a:r>
+              <a:rPr lang="de-DE" sz="1050" dirty="0"/>
+              <a:t>Huang2: 10</a:t>
+            </a:r>
+          </a:p>
+          <a:p>
+            <a:r>
+              <a:rPr lang="de-DE" sz="1050" dirty="0" err="1"/>
+              <a:t>Intermodes</a:t>
+            </a:r>
+            <a:r>
+              <a:rPr lang="de-DE" sz="1050" dirty="0"/>
+              <a:t>: 20</a:t>
+            </a:r>
+          </a:p>
+          <a:p>
+            <a:r>
+              <a:rPr lang="de-DE" sz="1050" dirty="0" err="1"/>
+              <a:t>IsoData</a:t>
+            </a:r>
+            <a:r>
+              <a:rPr lang="de-DE" sz="1050" dirty="0"/>
+              <a:t>: 9</a:t>
+            </a:r>
+          </a:p>
+          <a:p>
+            <a:r>
+              <a:rPr lang="de-DE" sz="1050" dirty="0"/>
+              <a:t>Li: 10</a:t>
+            </a:r>
+          </a:p>
+          <a:p>
+            <a:r>
+              <a:rPr lang="de-DE" sz="1050" dirty="0" err="1"/>
+              <a:t>MaxEntropy</a:t>
+            </a:r>
+            <a:r>
+              <a:rPr lang="de-DE" sz="1050" dirty="0"/>
+              <a:t>: 15</a:t>
+            </a:r>
+          </a:p>
+          <a:p>
+            <a:r>
+              <a:rPr lang="de-DE" sz="1050" dirty="0" err="1"/>
+              <a:t>Mean</a:t>
+            </a:r>
+            <a:r>
+              <a:rPr lang="de-DE" sz="1050" dirty="0"/>
+              <a:t>: 10</a:t>
+            </a:r>
+          </a:p>
+          <a:p>
+            <a:r>
+              <a:rPr lang="de-DE" sz="1050" dirty="0" err="1"/>
+              <a:t>MinError</a:t>
+            </a:r>
+            <a:r>
+              <a:rPr lang="de-DE" sz="1050" dirty="0"/>
+              <a:t>(I): 10</a:t>
+            </a:r>
+          </a:p>
+          <a:p>
+            <a:r>
+              <a:rPr lang="de-DE" sz="1050" dirty="0"/>
+              <a:t>Minimum: 28</a:t>
+            </a:r>
+          </a:p>
+          <a:p>
+            <a:r>
+              <a:rPr lang="de-DE" sz="1050" dirty="0"/>
+              <a:t>Moments: 11</a:t>
+            </a:r>
+          </a:p>
+          <a:p>
+            <a:r>
+              <a:rPr lang="de-DE" sz="1050" b="1" dirty="0"/>
+              <a:t>Otsu: 10</a:t>
+            </a:r>
+          </a:p>
+          <a:p>
+            <a:r>
+              <a:rPr lang="de-DE" sz="1050" dirty="0" err="1"/>
+              <a:t>Percentile</a:t>
+            </a:r>
+            <a:r>
+              <a:rPr lang="de-DE" sz="1050" dirty="0"/>
+              <a:t>: 10</a:t>
+            </a:r>
+          </a:p>
+          <a:p>
+            <a:r>
+              <a:rPr lang="de-DE" sz="1050" dirty="0" err="1"/>
+              <a:t>RenyiEntropy</a:t>
+            </a:r>
+            <a:r>
+              <a:rPr lang="de-DE" sz="1050" dirty="0"/>
+              <a:t>: 15</a:t>
+            </a:r>
+          </a:p>
+          <a:p>
+            <a:r>
+              <a:rPr lang="de-DE" sz="1050" dirty="0" err="1"/>
+              <a:t>Shanbhag</a:t>
+            </a:r>
+            <a:r>
+              <a:rPr lang="de-DE" sz="1050" dirty="0"/>
+              <a:t>: 10</a:t>
+            </a:r>
+          </a:p>
+          <a:p>
+            <a:r>
+              <a:rPr lang="de-DE" sz="1050" dirty="0" err="1"/>
+              <a:t>Triangle</a:t>
+            </a:r>
+            <a:r>
+              <a:rPr lang="de-DE" sz="1050" dirty="0"/>
+              <a:t>: 21</a:t>
+            </a:r>
+          </a:p>
+          <a:p>
+            <a:r>
+              <a:rPr lang="de-DE" sz="1050" dirty="0"/>
+              <a:t>Yen: 15</a:t>
+            </a:r>
+          </a:p>
+        </p:txBody>
+      </p:sp>
+      <p:sp>
+        <p:nvSpPr>
+          <p:cNvPr id="13" name="Rectangle 12">
+            <a:extLst>
+              <a:ext uri="{FF2B5EF4-FFF2-40B4-BE49-F238E27FC236}">
+                <a16:creationId xmlns:a16="http://schemas.microsoft.com/office/drawing/2014/main" id="{A451AAC5-E118-2846-B256-A9A6FCCB849A}"/>
+              </a:ext>
+            </a:extLst>
+          </p:cNvPr>
+          <p:cNvSpPr/>
+          <p:nvPr/>
+        </p:nvSpPr>
+        <p:spPr>
+          <a:xfrm>
+            <a:off x="14433625" y="1904827"/>
+            <a:ext cx="2001351" cy="3000821"/>
+          </a:xfrm>
+          <a:prstGeom prst="rect">
+            <a:avLst/>
+          </a:prstGeom>
+        </p:spPr>
+        <p:txBody>
+          <a:bodyPr wrap="square">
+            <a:spAutoFit/>
+          </a:bodyPr>
+          <a:lstStyle/>
+          <a:p>
+            <a:r>
+              <a:rPr lang="de-DE" sz="1050" dirty="0"/>
+              <a:t>xy_8bit__two_bright_one_dark</a:t>
+            </a:r>
+          </a:p>
+          <a:p>
+            <a:r>
+              <a:rPr lang="de-DE" sz="1050" dirty="0"/>
+              <a:t>Default: 111</a:t>
+            </a:r>
+          </a:p>
+          <a:p>
+            <a:r>
+              <a:rPr lang="de-DE" sz="1050" b="1" dirty="0"/>
+              <a:t>Huang: 55</a:t>
+            </a:r>
+          </a:p>
+          <a:p>
+            <a:r>
+              <a:rPr lang="de-DE" sz="1050" dirty="0"/>
+              <a:t>Huang2: 58</a:t>
+            </a:r>
+          </a:p>
+          <a:p>
+            <a:r>
+              <a:rPr lang="de-DE" sz="1050" dirty="0" err="1"/>
+              <a:t>Intermodes</a:t>
+            </a:r>
+            <a:r>
+              <a:rPr lang="de-DE" sz="1050" dirty="0"/>
+              <a:t>: 113</a:t>
+            </a:r>
+          </a:p>
+          <a:p>
+            <a:r>
+              <a:rPr lang="de-DE" sz="1050" dirty="0" err="1"/>
+              <a:t>IsoData</a:t>
+            </a:r>
+            <a:r>
+              <a:rPr lang="de-DE" sz="1050" dirty="0"/>
+              <a:t>: 111</a:t>
+            </a:r>
+          </a:p>
+          <a:p>
+            <a:r>
+              <a:rPr lang="de-DE" sz="1050" dirty="0"/>
+              <a:t>Li: 61</a:t>
+            </a:r>
+          </a:p>
+          <a:p>
+            <a:r>
+              <a:rPr lang="de-DE" sz="1050" dirty="0" err="1"/>
+              <a:t>MaxEntropy</a:t>
+            </a:r>
+            <a:r>
+              <a:rPr lang="de-DE" sz="1050" dirty="0"/>
+              <a:t>: 90</a:t>
+            </a:r>
+          </a:p>
+          <a:p>
+            <a:r>
+              <a:rPr lang="de-DE" sz="1050" dirty="0" err="1"/>
+              <a:t>Mean</a:t>
+            </a:r>
+            <a:r>
+              <a:rPr lang="de-DE" sz="1050" dirty="0"/>
+              <a:t>: 72</a:t>
+            </a:r>
+          </a:p>
+          <a:p>
+            <a:r>
+              <a:rPr lang="de-DE" sz="1050" dirty="0" err="1"/>
+              <a:t>MinError</a:t>
+            </a:r>
+            <a:r>
+              <a:rPr lang="de-DE" sz="1050" dirty="0"/>
+              <a:t>(I): 21</a:t>
+            </a:r>
+          </a:p>
+          <a:p>
+            <a:r>
+              <a:rPr lang="de-DE" sz="1050" dirty="0"/>
+              <a:t>Minimum: 140</a:t>
+            </a:r>
+          </a:p>
+          <a:p>
+            <a:r>
+              <a:rPr lang="de-DE" sz="1050" dirty="0"/>
+              <a:t>Moments: 88</a:t>
+            </a:r>
+          </a:p>
+          <a:p>
+            <a:r>
+              <a:rPr lang="de-DE" sz="1050" b="1" dirty="0"/>
+              <a:t>Otsu: 111</a:t>
+            </a:r>
+          </a:p>
+          <a:p>
+            <a:r>
+              <a:rPr lang="de-DE" sz="1050" dirty="0" err="1"/>
+              <a:t>Percentile</a:t>
+            </a:r>
+            <a:r>
+              <a:rPr lang="de-DE" sz="1050" dirty="0"/>
+              <a:t>: 30</a:t>
+            </a:r>
+          </a:p>
+          <a:p>
+            <a:r>
+              <a:rPr lang="de-DE" sz="1050" dirty="0" err="1"/>
+              <a:t>RenyiEntropy</a:t>
+            </a:r>
+            <a:r>
+              <a:rPr lang="de-DE" sz="1050" dirty="0"/>
+              <a:t>: 60</a:t>
+            </a:r>
+          </a:p>
+          <a:p>
+            <a:r>
+              <a:rPr lang="de-DE" sz="1050" dirty="0" err="1"/>
+              <a:t>Shanbhag</a:t>
+            </a:r>
+            <a:r>
+              <a:rPr lang="de-DE" sz="1050" dirty="0"/>
+              <a:t>: 110</a:t>
+            </a:r>
+          </a:p>
+          <a:p>
+            <a:r>
+              <a:rPr lang="de-DE" sz="1050" dirty="0" err="1"/>
+              <a:t>Triangle</a:t>
+            </a:r>
+            <a:r>
+              <a:rPr lang="de-DE" sz="1050" dirty="0"/>
+              <a:t>: 29</a:t>
+            </a:r>
+          </a:p>
+          <a:p>
+            <a:r>
+              <a:rPr lang="de-DE" sz="1050" dirty="0"/>
+              <a:t>Yen: 45</a:t>
+            </a:r>
+          </a:p>
+        </p:txBody>
+      </p:sp>
+      <p:pic>
+        <p:nvPicPr>
+          <p:cNvPr id="15" name="Picture 14">
+            <a:extLst>
+              <a:ext uri="{FF2B5EF4-FFF2-40B4-BE49-F238E27FC236}">
+                <a16:creationId xmlns:a16="http://schemas.microsoft.com/office/drawing/2014/main" id="{65C659A7-583D-C04A-9FD5-D9D56E6A9261}"/>
+              </a:ext>
+            </a:extLst>
+          </p:cNvPr>
+          <p:cNvPicPr>
+            <a:picLocks noChangeAspect="1"/>
+          </p:cNvPicPr>
+          <p:nvPr/>
+        </p:nvPicPr>
+        <p:blipFill>
+          <a:blip r:embed="rId5"/>
+          <a:stretch>
+            <a:fillRect/>
+          </a:stretch>
+        </p:blipFill>
+        <p:spPr>
+          <a:xfrm>
+            <a:off x="9095599" y="4909211"/>
+            <a:ext cx="2626283" cy="984856"/>
+          </a:xfrm>
+          <a:prstGeom prst="rect">
+            <a:avLst/>
+          </a:prstGeom>
+        </p:spPr>
+      </p:pic>
+      <p:pic>
+        <p:nvPicPr>
+          <p:cNvPr id="16" name="Picture 15">
+            <a:extLst>
+              <a:ext uri="{FF2B5EF4-FFF2-40B4-BE49-F238E27FC236}">
+                <a16:creationId xmlns:a16="http://schemas.microsoft.com/office/drawing/2014/main" id="{EF3B66AD-3B79-6747-81E2-7AE807D3BCF6}"/>
+              </a:ext>
+            </a:extLst>
+          </p:cNvPr>
+          <p:cNvPicPr>
+            <a:picLocks noChangeAspect="1"/>
+          </p:cNvPicPr>
+          <p:nvPr/>
+        </p:nvPicPr>
+        <p:blipFill>
+          <a:blip r:embed="rId6"/>
+          <a:stretch>
+            <a:fillRect/>
+          </a:stretch>
+        </p:blipFill>
+        <p:spPr>
+          <a:xfrm>
+            <a:off x="6241637" y="4916024"/>
+            <a:ext cx="2608114" cy="978043"/>
+          </a:xfrm>
+          <a:prstGeom prst="rect">
+            <a:avLst/>
+          </a:prstGeom>
+        </p:spPr>
+      </p:pic>
+      <p:pic>
+        <p:nvPicPr>
+          <p:cNvPr id="17" name="Picture 16">
+            <a:extLst>
+              <a:ext uri="{FF2B5EF4-FFF2-40B4-BE49-F238E27FC236}">
+                <a16:creationId xmlns:a16="http://schemas.microsoft.com/office/drawing/2014/main" id="{603AE2B9-DDD4-D940-80C9-1786CD7D57A2}"/>
+              </a:ext>
+            </a:extLst>
+          </p:cNvPr>
+          <p:cNvPicPr>
+            <a:picLocks noChangeAspect="1"/>
+          </p:cNvPicPr>
+          <p:nvPr/>
+        </p:nvPicPr>
+        <p:blipFill>
+          <a:blip r:embed="rId7"/>
+          <a:stretch>
+            <a:fillRect/>
+          </a:stretch>
+        </p:blipFill>
+        <p:spPr>
+          <a:xfrm>
+            <a:off x="9095599" y="1434468"/>
+            <a:ext cx="2626283" cy="984856"/>
+          </a:xfrm>
+          <a:prstGeom prst="rect">
+            <a:avLst/>
+          </a:prstGeom>
+        </p:spPr>
+      </p:pic>
+      <p:pic>
+        <p:nvPicPr>
+          <p:cNvPr id="18" name="Picture 17">
+            <a:extLst>
+              <a:ext uri="{FF2B5EF4-FFF2-40B4-BE49-F238E27FC236}">
+                <a16:creationId xmlns:a16="http://schemas.microsoft.com/office/drawing/2014/main" id="{1EB7C462-FC3B-C545-9592-4156DD351191}"/>
+              </a:ext>
+            </a:extLst>
+          </p:cNvPr>
+          <p:cNvPicPr>
+            <a:picLocks noChangeAspect="1"/>
+          </p:cNvPicPr>
+          <p:nvPr/>
+        </p:nvPicPr>
+        <p:blipFill>
+          <a:blip r:embed="rId8"/>
+          <a:stretch>
+            <a:fillRect/>
+          </a:stretch>
+        </p:blipFill>
+        <p:spPr>
+          <a:xfrm>
+            <a:off x="6232553" y="1434468"/>
+            <a:ext cx="2626283" cy="984856"/>
+          </a:xfrm>
+          <a:prstGeom prst="rect">
+            <a:avLst/>
+          </a:prstGeom>
+        </p:spPr>
+      </p:pic>
+      <p:pic>
+        <p:nvPicPr>
+          <p:cNvPr id="19" name="Picture 18">
+            <a:extLst>
+              <a:ext uri="{FF2B5EF4-FFF2-40B4-BE49-F238E27FC236}">
+                <a16:creationId xmlns:a16="http://schemas.microsoft.com/office/drawing/2014/main" id="{411F920C-8498-224A-A2B3-24F8FBF9A054}"/>
+              </a:ext>
+            </a:extLst>
+          </p:cNvPr>
+          <p:cNvPicPr>
+            <a:picLocks noChangeAspect="1"/>
+          </p:cNvPicPr>
+          <p:nvPr/>
+        </p:nvPicPr>
+        <p:blipFill>
+          <a:blip r:embed="rId9"/>
+          <a:stretch>
+            <a:fillRect/>
+          </a:stretch>
+        </p:blipFill>
+        <p:spPr>
+          <a:xfrm>
+            <a:off x="9095599" y="3208734"/>
+            <a:ext cx="2626283" cy="984856"/>
+          </a:xfrm>
+          <a:prstGeom prst="rect">
+            <a:avLst/>
+          </a:prstGeom>
+        </p:spPr>
+      </p:pic>
+      <p:pic>
+        <p:nvPicPr>
+          <p:cNvPr id="20" name="Picture 19">
+            <a:extLst>
+              <a:ext uri="{FF2B5EF4-FFF2-40B4-BE49-F238E27FC236}">
+                <a16:creationId xmlns:a16="http://schemas.microsoft.com/office/drawing/2014/main" id="{0E1A0B80-0074-A245-9BC4-F2B33C1AD887}"/>
+              </a:ext>
+            </a:extLst>
+          </p:cNvPr>
+          <p:cNvPicPr>
+            <a:picLocks noChangeAspect="1"/>
+          </p:cNvPicPr>
+          <p:nvPr/>
+        </p:nvPicPr>
+        <p:blipFill>
+          <a:blip r:embed="rId10"/>
+          <a:stretch>
+            <a:fillRect/>
+          </a:stretch>
+        </p:blipFill>
+        <p:spPr>
+          <a:xfrm>
+            <a:off x="6232553" y="3208734"/>
+            <a:ext cx="2626283" cy="984856"/>
+          </a:xfrm>
+          <a:prstGeom prst="rect">
+            <a:avLst/>
+          </a:prstGeom>
+        </p:spPr>
+      </p:pic>
+      <p:grpSp>
+        <p:nvGrpSpPr>
+          <p:cNvPr id="29" name="Group 28"/>
+          <p:cNvGrpSpPr/>
+          <p:nvPr/>
+        </p:nvGrpSpPr>
+        <p:grpSpPr>
+          <a:xfrm>
+            <a:off x="3509848" y="2795823"/>
+            <a:ext cx="2287838" cy="1585290"/>
+            <a:chOff x="3347923" y="2243373"/>
+            <a:chExt cx="2287838" cy="1585290"/>
+          </a:xfrm>
+        </p:grpSpPr>
+        <p:pic>
+          <p:nvPicPr>
+            <p:cNvPr id="8" name="Picture 7">
+              <a:extLst>
+                <a:ext uri="{FF2B5EF4-FFF2-40B4-BE49-F238E27FC236}">
+                  <a16:creationId xmlns:a16="http://schemas.microsoft.com/office/drawing/2014/main" id="{1D45D401-86BF-5644-8C9C-4FB58FD2DA42}"/>
+                </a:ext>
+              </a:extLst>
+            </p:cNvPr>
+            <p:cNvPicPr>
+              <a:picLocks noChangeAspect="1"/>
+            </p:cNvPicPr>
+            <p:nvPr/>
+          </p:nvPicPr>
+          <p:blipFill rotWithShape="1">
+            <a:blip r:embed="rId11"/>
+            <a:srcRect b="29216"/>
+            <a:stretch/>
+          </p:blipFill>
+          <p:spPr>
+            <a:xfrm>
+              <a:off x="3347923" y="2500725"/>
+              <a:ext cx="2287838" cy="1327938"/>
+            </a:xfrm>
+            <a:prstGeom prst="rect">
+              <a:avLst/>
+            </a:prstGeom>
+          </p:spPr>
+        </p:pic>
+        <p:grpSp>
+          <p:nvGrpSpPr>
+            <p:cNvPr id="40" name="Group 39"/>
+            <p:cNvGrpSpPr/>
+            <p:nvPr/>
+          </p:nvGrpSpPr>
+          <p:grpSpPr>
+            <a:xfrm>
+              <a:off x="4271682" y="2376826"/>
+              <a:ext cx="1182967" cy="187986"/>
+              <a:chOff x="4300566" y="587375"/>
+              <a:chExt cx="1154084" cy="187986"/>
+            </a:xfrm>
+          </p:grpSpPr>
+          <p:cxnSp>
+            <p:nvCxnSpPr>
+              <p:cNvPr id="41" name="Straight Connector 40"/>
+              <p:cNvCxnSpPr/>
+              <p:nvPr/>
+            </p:nvCxnSpPr>
+            <p:spPr>
+              <a:xfrm>
+                <a:off x="4300566" y="681368"/>
+                <a:ext cx="1154084" cy="0"/>
+              </a:xfrm>
+              <a:prstGeom prst="line">
+                <a:avLst/>
+              </a:prstGeom>
+              <a:ln w="38100"/>
+            </p:spPr>
+            <p:style>
+              <a:lnRef idx="1">
+                <a:schemeClr val="accent2"/>
+              </a:lnRef>
+              <a:fillRef idx="0">
+                <a:schemeClr val="accent2"/>
+              </a:fillRef>
+              <a:effectRef idx="0">
+                <a:schemeClr val="accent2"/>
+              </a:effectRef>
+              <a:fontRef idx="minor">
+                <a:schemeClr val="tx1"/>
+              </a:fontRef>
+            </p:style>
+          </p:cxnSp>
+          <p:cxnSp>
+            <p:nvCxnSpPr>
+              <p:cNvPr id="42" name="Straight Connector 41"/>
+              <p:cNvCxnSpPr/>
+              <p:nvPr/>
+            </p:nvCxnSpPr>
+            <p:spPr>
+              <a:xfrm>
+                <a:off x="4300566" y="587375"/>
+                <a:ext cx="0" cy="187986"/>
+              </a:xfrm>
+              <a:prstGeom prst="line">
+                <a:avLst/>
+              </a:prstGeom>
+              <a:ln w="28575"/>
+            </p:spPr>
+            <p:style>
+              <a:lnRef idx="1">
+                <a:schemeClr val="accent2"/>
+              </a:lnRef>
+              <a:fillRef idx="0">
+                <a:schemeClr val="accent2"/>
+              </a:fillRef>
+              <a:effectRef idx="0">
+                <a:schemeClr val="accent2"/>
+              </a:effectRef>
+              <a:fontRef idx="minor">
+                <a:schemeClr val="tx1"/>
+              </a:fontRef>
+            </p:style>
+          </p:cxnSp>
+        </p:grpSp>
+        <p:grpSp>
+          <p:nvGrpSpPr>
+            <p:cNvPr id="43" name="Group 42"/>
+            <p:cNvGrpSpPr/>
+            <p:nvPr/>
+          </p:nvGrpSpPr>
+          <p:grpSpPr>
+            <a:xfrm>
+              <a:off x="3902939" y="2243373"/>
+              <a:ext cx="1551711" cy="187986"/>
+              <a:chOff x="4300566" y="587375"/>
+              <a:chExt cx="1229209" cy="187986"/>
+            </a:xfrm>
+          </p:grpSpPr>
+          <p:cxnSp>
+            <p:nvCxnSpPr>
+              <p:cNvPr id="44" name="Straight Connector 43"/>
+              <p:cNvCxnSpPr/>
+              <p:nvPr/>
+            </p:nvCxnSpPr>
+            <p:spPr>
+              <a:xfrm>
+                <a:off x="4300566" y="681368"/>
+                <a:ext cx="1229209" cy="0"/>
+              </a:xfrm>
+              <a:prstGeom prst="line">
+                <a:avLst/>
+              </a:prstGeom>
+              <a:ln w="38100">
+                <a:solidFill>
+                  <a:schemeClr val="accent1"/>
+                </a:solidFill>
+              </a:ln>
+            </p:spPr>
+            <p:style>
+              <a:lnRef idx="1">
+                <a:schemeClr val="accent2"/>
+              </a:lnRef>
+              <a:fillRef idx="0">
+                <a:schemeClr val="accent2"/>
+              </a:fillRef>
+              <a:effectRef idx="0">
+                <a:schemeClr val="accent2"/>
+              </a:effectRef>
+              <a:fontRef idx="minor">
+                <a:schemeClr val="tx1"/>
+              </a:fontRef>
+            </p:style>
+          </p:cxnSp>
+          <p:cxnSp>
+            <p:nvCxnSpPr>
+              <p:cNvPr id="45" name="Straight Connector 44"/>
+              <p:cNvCxnSpPr/>
+              <p:nvPr/>
+            </p:nvCxnSpPr>
+            <p:spPr>
+              <a:xfrm>
+                <a:off x="4300566" y="587375"/>
+                <a:ext cx="0" cy="187986"/>
+              </a:xfrm>
+              <a:prstGeom prst="line">
+                <a:avLst/>
+              </a:prstGeom>
+              <a:ln w="28575">
+                <a:solidFill>
+                  <a:schemeClr val="accent1"/>
+                </a:solidFill>
+              </a:ln>
+            </p:spPr>
+            <p:style>
+              <a:lnRef idx="1">
+                <a:schemeClr val="accent2"/>
+              </a:lnRef>
+              <a:fillRef idx="0">
+                <a:schemeClr val="accent2"/>
+              </a:fillRef>
+              <a:effectRef idx="0">
+                <a:schemeClr val="accent2"/>
+              </a:effectRef>
+              <a:fontRef idx="minor">
+                <a:schemeClr val="tx1"/>
+              </a:fontRef>
+            </p:style>
+          </p:cxnSp>
+        </p:grpSp>
+        <p:cxnSp>
+          <p:nvCxnSpPr>
+            <p:cNvPr id="46" name="Straight Connector 45">
+              <a:extLst>
+                <a:ext uri="{FF2B5EF4-FFF2-40B4-BE49-F238E27FC236}">
+                  <a16:creationId xmlns:a16="http://schemas.microsoft.com/office/drawing/2014/main" id="{BAA7B587-28D0-C841-972B-AD72B5536FE9}"/>
+                </a:ext>
+              </a:extLst>
+            </p:cNvPr>
+            <p:cNvCxnSpPr>
+              <a:cxnSpLocks/>
+            </p:cNvCxnSpPr>
+            <p:nvPr/>
+          </p:nvCxnSpPr>
+          <p:spPr>
+            <a:xfrm>
+              <a:off x="4271683" y="2581377"/>
+              <a:ext cx="0" cy="1075745"/>
+            </a:xfrm>
+            <a:prstGeom prst="line">
+              <a:avLst/>
+            </a:prstGeom>
+            <a:ln w="19050">
+              <a:solidFill>
+                <a:schemeClr val="accent2"/>
+              </a:solidFill>
+              <a:prstDash val="sysDash"/>
+            </a:ln>
+          </p:spPr>
+          <p:style>
+            <a:lnRef idx="1">
+              <a:schemeClr val="accent1"/>
+            </a:lnRef>
+            <a:fillRef idx="0">
+              <a:schemeClr val="accent1"/>
+            </a:fillRef>
+            <a:effectRef idx="0">
+              <a:schemeClr val="accent1"/>
+            </a:effectRef>
+            <a:fontRef idx="minor">
+              <a:schemeClr val="tx1"/>
+            </a:fontRef>
+          </p:style>
+        </p:cxnSp>
+        <p:cxnSp>
+          <p:nvCxnSpPr>
+            <p:cNvPr id="47" name="Straight Connector 46">
+              <a:extLst>
+                <a:ext uri="{FF2B5EF4-FFF2-40B4-BE49-F238E27FC236}">
+                  <a16:creationId xmlns:a16="http://schemas.microsoft.com/office/drawing/2014/main" id="{BAA7B587-28D0-C841-972B-AD72B5536FE9}"/>
+                </a:ext>
+              </a:extLst>
+            </p:cNvPr>
+            <p:cNvCxnSpPr>
+              <a:cxnSpLocks/>
+            </p:cNvCxnSpPr>
+            <p:nvPr/>
+          </p:nvCxnSpPr>
+          <p:spPr>
+            <a:xfrm>
+              <a:off x="3901323" y="2558093"/>
+              <a:ext cx="0" cy="1075745"/>
+            </a:xfrm>
+            <a:prstGeom prst="line">
+              <a:avLst/>
+            </a:prstGeom>
+            <a:ln w="19050">
+              <a:prstDash val="sysDash"/>
+            </a:ln>
+          </p:spPr>
+          <p:style>
+            <a:lnRef idx="1">
+              <a:schemeClr val="accent1"/>
+            </a:lnRef>
+            <a:fillRef idx="0">
+              <a:schemeClr val="accent1"/>
+            </a:fillRef>
+            <a:effectRef idx="0">
+              <a:schemeClr val="accent1"/>
+            </a:effectRef>
+            <a:fontRef idx="minor">
+              <a:schemeClr val="tx1"/>
+            </a:fontRef>
+          </p:style>
+        </p:cxnSp>
+      </p:grpSp>
+      <p:grpSp>
+        <p:nvGrpSpPr>
+          <p:cNvPr id="63" name="Group 62"/>
+          <p:cNvGrpSpPr/>
+          <p:nvPr/>
+        </p:nvGrpSpPr>
+        <p:grpSpPr>
+          <a:xfrm>
+            <a:off x="3509848" y="4560133"/>
+            <a:ext cx="2287837" cy="1578775"/>
+            <a:chOff x="3347924" y="4007683"/>
+            <a:chExt cx="2287837" cy="1578775"/>
+          </a:xfrm>
+        </p:grpSpPr>
+        <p:pic>
+          <p:nvPicPr>
+            <p:cNvPr id="50" name="Picture 49">
+              <a:extLst>
+                <a:ext uri="{FF2B5EF4-FFF2-40B4-BE49-F238E27FC236}">
+                  <a16:creationId xmlns:a16="http://schemas.microsoft.com/office/drawing/2014/main" id="{7260EFD8-F196-654E-A935-703FEDA77D03}"/>
+                </a:ext>
+              </a:extLst>
+            </p:cNvPr>
+            <p:cNvPicPr>
+              <a:picLocks noChangeAspect="1"/>
+            </p:cNvPicPr>
+            <p:nvPr/>
+          </p:nvPicPr>
+          <p:blipFill rotWithShape="1">
+            <a:blip r:embed="rId12"/>
+            <a:srcRect b="30333"/>
+            <a:stretch/>
+          </p:blipFill>
+          <p:spPr>
+            <a:xfrm>
+              <a:off x="3347924" y="4279487"/>
+              <a:ext cx="2287837" cy="1306971"/>
+            </a:xfrm>
+            <a:prstGeom prst="rect">
+              <a:avLst/>
+            </a:prstGeom>
+          </p:spPr>
+        </p:pic>
+        <p:grpSp>
+          <p:nvGrpSpPr>
+            <p:cNvPr id="51" name="Group 50"/>
+            <p:cNvGrpSpPr/>
+            <p:nvPr/>
+          </p:nvGrpSpPr>
+          <p:grpSpPr>
+            <a:xfrm>
+              <a:off x="3586957" y="4174477"/>
+              <a:ext cx="1867693" cy="187986"/>
+              <a:chOff x="4300566" y="587375"/>
+              <a:chExt cx="1154084" cy="187986"/>
+            </a:xfrm>
+          </p:grpSpPr>
+          <p:cxnSp>
+            <p:nvCxnSpPr>
+              <p:cNvPr id="52" name="Straight Connector 51"/>
+              <p:cNvCxnSpPr/>
+              <p:nvPr/>
+            </p:nvCxnSpPr>
+            <p:spPr>
+              <a:xfrm>
+                <a:off x="4300566" y="681368"/>
+                <a:ext cx="1154084" cy="0"/>
+              </a:xfrm>
+              <a:prstGeom prst="line">
+                <a:avLst/>
+              </a:prstGeom>
+              <a:ln w="38100"/>
+            </p:spPr>
+            <p:style>
+              <a:lnRef idx="1">
+                <a:schemeClr val="accent2"/>
+              </a:lnRef>
+              <a:fillRef idx="0">
+                <a:schemeClr val="accent2"/>
+              </a:fillRef>
+              <a:effectRef idx="0">
+                <a:schemeClr val="accent2"/>
+              </a:effectRef>
+              <a:fontRef idx="minor">
+                <a:schemeClr val="tx1"/>
+              </a:fontRef>
+            </p:style>
+          </p:cxnSp>
+          <p:cxnSp>
+            <p:nvCxnSpPr>
+              <p:cNvPr id="53" name="Straight Connector 52"/>
+              <p:cNvCxnSpPr/>
+              <p:nvPr/>
+            </p:nvCxnSpPr>
+            <p:spPr>
+              <a:xfrm>
+                <a:off x="4300566" y="587375"/>
+                <a:ext cx="0" cy="187986"/>
+              </a:xfrm>
+              <a:prstGeom prst="line">
+                <a:avLst/>
+              </a:prstGeom>
+              <a:ln w="28575"/>
+            </p:spPr>
+            <p:style>
+              <a:lnRef idx="1">
+                <a:schemeClr val="accent2"/>
+              </a:lnRef>
+              <a:fillRef idx="0">
+                <a:schemeClr val="accent2"/>
+              </a:fillRef>
+              <a:effectRef idx="0">
+                <a:schemeClr val="accent2"/>
+              </a:effectRef>
+              <a:fontRef idx="minor">
+                <a:schemeClr val="tx1"/>
+              </a:fontRef>
+            </p:style>
+          </p:cxnSp>
+        </p:grpSp>
+        <p:grpSp>
+          <p:nvGrpSpPr>
+            <p:cNvPr id="54" name="Group 53"/>
+            <p:cNvGrpSpPr/>
+            <p:nvPr/>
+          </p:nvGrpSpPr>
+          <p:grpSpPr>
+            <a:xfrm>
+              <a:off x="3586957" y="4007683"/>
+              <a:ext cx="1867693" cy="187986"/>
+              <a:chOff x="4300566" y="587375"/>
+              <a:chExt cx="1229209" cy="187986"/>
+            </a:xfrm>
+          </p:grpSpPr>
+          <p:cxnSp>
+            <p:nvCxnSpPr>
+              <p:cNvPr id="55" name="Straight Connector 54"/>
+              <p:cNvCxnSpPr/>
+              <p:nvPr/>
+            </p:nvCxnSpPr>
+            <p:spPr>
+              <a:xfrm>
+                <a:off x="4300566" y="681368"/>
+                <a:ext cx="1229209" cy="0"/>
+              </a:xfrm>
+              <a:prstGeom prst="line">
+                <a:avLst/>
+              </a:prstGeom>
+              <a:ln w="38100">
+                <a:solidFill>
+                  <a:schemeClr val="accent1"/>
+                </a:solidFill>
+              </a:ln>
+            </p:spPr>
+            <p:style>
+              <a:lnRef idx="1">
+                <a:schemeClr val="accent2"/>
+              </a:lnRef>
+              <a:fillRef idx="0">
+                <a:schemeClr val="accent2"/>
+              </a:fillRef>
+              <a:effectRef idx="0">
+                <a:schemeClr val="accent2"/>
+              </a:effectRef>
+              <a:fontRef idx="minor">
+                <a:schemeClr val="tx1"/>
+              </a:fontRef>
+            </p:style>
+          </p:cxnSp>
+          <p:cxnSp>
+            <p:nvCxnSpPr>
+              <p:cNvPr id="56" name="Straight Connector 55"/>
+              <p:cNvCxnSpPr/>
+              <p:nvPr/>
+            </p:nvCxnSpPr>
+            <p:spPr>
+              <a:xfrm>
+                <a:off x="4300566" y="587375"/>
+                <a:ext cx="0" cy="187986"/>
+              </a:xfrm>
+              <a:prstGeom prst="line">
+                <a:avLst/>
+              </a:prstGeom>
+              <a:ln w="28575">
+                <a:solidFill>
+                  <a:schemeClr val="accent1"/>
+                </a:solidFill>
+              </a:ln>
+            </p:spPr>
+            <p:style>
+              <a:lnRef idx="1">
+                <a:schemeClr val="accent2"/>
+              </a:lnRef>
+              <a:fillRef idx="0">
+                <a:schemeClr val="accent2"/>
+              </a:fillRef>
+              <a:effectRef idx="0">
+                <a:schemeClr val="accent2"/>
+              </a:effectRef>
+              <a:fontRef idx="minor">
+                <a:schemeClr val="tx1"/>
+              </a:fontRef>
+            </p:style>
+          </p:cxnSp>
+        </p:grpSp>
+        <p:cxnSp>
+          <p:nvCxnSpPr>
+            <p:cNvPr id="57" name="Straight Connector 56">
+              <a:extLst>
+                <a:ext uri="{FF2B5EF4-FFF2-40B4-BE49-F238E27FC236}">
+                  <a16:creationId xmlns:a16="http://schemas.microsoft.com/office/drawing/2014/main" id="{BAA7B587-28D0-C841-972B-AD72B5536FE9}"/>
+                </a:ext>
+              </a:extLst>
+            </p:cNvPr>
+            <p:cNvCxnSpPr>
+              <a:cxnSpLocks/>
+            </p:cNvCxnSpPr>
+            <p:nvPr/>
+          </p:nvCxnSpPr>
+          <p:spPr>
+            <a:xfrm>
+              <a:off x="3586957" y="4367775"/>
+              <a:ext cx="0" cy="1075745"/>
+            </a:xfrm>
+            <a:prstGeom prst="line">
+              <a:avLst/>
+            </a:prstGeom>
+            <a:ln w="19050">
+              <a:solidFill>
+                <a:schemeClr val="accent2"/>
+              </a:solidFill>
+              <a:prstDash val="solid"/>
+            </a:ln>
+          </p:spPr>
+          <p:style>
+            <a:lnRef idx="1">
+              <a:schemeClr val="accent1"/>
+            </a:lnRef>
+            <a:fillRef idx="0">
+              <a:schemeClr val="accent1"/>
+            </a:fillRef>
+            <a:effectRef idx="0">
+              <a:schemeClr val="accent1"/>
+            </a:effectRef>
+            <a:fontRef idx="minor">
+              <a:schemeClr val="tx1"/>
+            </a:fontRef>
+          </p:style>
+        </p:cxnSp>
+        <p:cxnSp>
+          <p:nvCxnSpPr>
+            <p:cNvPr id="58" name="Straight Connector 57">
+              <a:extLst>
+                <a:ext uri="{FF2B5EF4-FFF2-40B4-BE49-F238E27FC236}">
+                  <a16:creationId xmlns:a16="http://schemas.microsoft.com/office/drawing/2014/main" id="{BAA7B587-28D0-C841-972B-AD72B5536FE9}"/>
+                </a:ext>
+              </a:extLst>
+            </p:cNvPr>
+            <p:cNvCxnSpPr>
+              <a:cxnSpLocks/>
+            </p:cNvCxnSpPr>
+            <p:nvPr/>
+          </p:nvCxnSpPr>
+          <p:spPr>
+            <a:xfrm>
+              <a:off x="3586957" y="4367775"/>
+              <a:ext cx="0" cy="1075745"/>
+            </a:xfrm>
+            <a:prstGeom prst="line">
+              <a:avLst/>
+            </a:prstGeom>
+            <a:ln w="19050">
+              <a:prstDash val="sysDash"/>
+            </a:ln>
+          </p:spPr>
+          <p:style>
+            <a:lnRef idx="1">
+              <a:schemeClr val="accent1"/>
+            </a:lnRef>
+            <a:fillRef idx="0">
+              <a:schemeClr val="accent1"/>
+            </a:fillRef>
+            <a:effectRef idx="0">
+              <a:schemeClr val="accent1"/>
+            </a:effectRef>
+            <a:fontRef idx="minor">
+              <a:schemeClr val="tx1"/>
+            </a:fontRef>
+          </p:style>
+        </p:cxnSp>
+      </p:grpSp>
+      <p:sp>
+        <p:nvSpPr>
+          <p:cNvPr id="27" name="TextBox 26"/>
+          <p:cNvSpPr txBox="1"/>
+          <p:nvPr/>
+        </p:nvSpPr>
+        <p:spPr>
+          <a:xfrm>
+            <a:off x="9095598" y="715154"/>
+            <a:ext cx="2626284" cy="646331"/>
+          </a:xfrm>
+          <a:prstGeom prst="rect">
+            <a:avLst/>
+          </a:prstGeom>
+          <a:noFill/>
+        </p:spPr>
+        <p:txBody>
+          <a:bodyPr wrap="square" rtlCol="0">
+            <a:spAutoFit/>
+          </a:bodyPr>
+          <a:lstStyle/>
+          <a:p>
+            <a:pPr algn="ctr"/>
+            <a:r>
+              <a:rPr lang="nl-NL" dirty="0" smtClean="0">
+                <a:solidFill>
+                  <a:schemeClr val="accent2"/>
+                </a:solidFill>
+              </a:rPr>
+              <a:t>Binary image using threshold 2</a:t>
+            </a:r>
+            <a:endParaRPr lang="en-US" dirty="0">
+              <a:solidFill>
+                <a:schemeClr val="accent2"/>
+              </a:solidFill>
+            </a:endParaRPr>
+          </a:p>
+        </p:txBody>
+      </p:sp>
+      <p:sp>
+        <p:nvSpPr>
+          <p:cNvPr id="59" name="TextBox 58"/>
+          <p:cNvSpPr txBox="1"/>
+          <p:nvPr/>
+        </p:nvSpPr>
+        <p:spPr>
+          <a:xfrm>
+            <a:off x="6241637" y="715154"/>
+            <a:ext cx="2608114" cy="646331"/>
+          </a:xfrm>
+          <a:prstGeom prst="rect">
+            <a:avLst/>
+          </a:prstGeom>
+          <a:noFill/>
+        </p:spPr>
+        <p:txBody>
+          <a:bodyPr wrap="square" rtlCol="0">
+            <a:spAutoFit/>
+          </a:bodyPr>
+          <a:lstStyle/>
+          <a:p>
+            <a:pPr algn="ctr"/>
+            <a:r>
+              <a:rPr lang="nl-NL" dirty="0" smtClean="0">
+                <a:solidFill>
+                  <a:schemeClr val="accent1"/>
+                </a:solidFill>
+              </a:rPr>
+              <a:t>Binary image using threshold 1</a:t>
+            </a:r>
+            <a:endParaRPr lang="en-US" dirty="0">
+              <a:solidFill>
+                <a:schemeClr val="accent1"/>
+              </a:solidFill>
+            </a:endParaRPr>
+          </a:p>
+        </p:txBody>
+      </p:sp>
+      <p:grpSp>
+        <p:nvGrpSpPr>
+          <p:cNvPr id="28" name="Group 27"/>
+          <p:cNvGrpSpPr/>
+          <p:nvPr/>
+        </p:nvGrpSpPr>
+        <p:grpSpPr>
+          <a:xfrm>
+            <a:off x="3509848" y="956758"/>
+            <a:ext cx="2465455" cy="1642284"/>
+            <a:chOff x="3347923" y="404308"/>
+            <a:chExt cx="2465455" cy="1642284"/>
+          </a:xfrm>
+        </p:grpSpPr>
+        <p:pic>
+          <p:nvPicPr>
+            <p:cNvPr id="7" name="Picture 6">
+              <a:extLst>
+                <a:ext uri="{FF2B5EF4-FFF2-40B4-BE49-F238E27FC236}">
+                  <a16:creationId xmlns:a16="http://schemas.microsoft.com/office/drawing/2014/main" id="{B312950F-30F8-8342-819B-3439D959D889}"/>
+                </a:ext>
+              </a:extLst>
+            </p:cNvPr>
+            <p:cNvPicPr>
+              <a:picLocks noChangeAspect="1"/>
+            </p:cNvPicPr>
+            <p:nvPr/>
+          </p:nvPicPr>
+          <p:blipFill rotWithShape="1">
+            <a:blip r:embed="rId13"/>
+            <a:srcRect b="30047"/>
+            <a:stretch/>
+          </p:blipFill>
+          <p:spPr>
+            <a:xfrm>
+              <a:off x="3347923" y="734265"/>
+              <a:ext cx="2287838" cy="1312327"/>
+            </a:xfrm>
+            <a:prstGeom prst="rect">
+              <a:avLst/>
+            </a:prstGeom>
+          </p:spPr>
+        </p:pic>
+        <p:cxnSp>
+          <p:nvCxnSpPr>
+            <p:cNvPr id="22" name="Straight Connector 21">
+              <a:extLst>
+                <a:ext uri="{FF2B5EF4-FFF2-40B4-BE49-F238E27FC236}">
+                  <a16:creationId xmlns:a16="http://schemas.microsoft.com/office/drawing/2014/main" id="{BAA7B587-28D0-C841-972B-AD72B5536FE9}"/>
+                </a:ext>
+              </a:extLst>
+            </p:cNvPr>
+            <p:cNvCxnSpPr>
+              <a:cxnSpLocks/>
+            </p:cNvCxnSpPr>
+            <p:nvPr/>
+          </p:nvCxnSpPr>
+          <p:spPr>
+            <a:xfrm>
+              <a:off x="4225441" y="807111"/>
+              <a:ext cx="0" cy="1075745"/>
+            </a:xfrm>
+            <a:prstGeom prst="line">
+              <a:avLst/>
+            </a:prstGeom>
+            <a:ln w="19050">
+              <a:prstDash val="sysDash"/>
+            </a:ln>
+          </p:spPr>
+          <p:style>
+            <a:lnRef idx="1">
+              <a:schemeClr val="accent1"/>
+            </a:lnRef>
+            <a:fillRef idx="0">
+              <a:schemeClr val="accent1"/>
+            </a:fillRef>
+            <a:effectRef idx="0">
+              <a:schemeClr val="accent1"/>
+            </a:effectRef>
+            <a:fontRef idx="minor">
+              <a:schemeClr val="tx1"/>
+            </a:fontRef>
+          </p:style>
+        </p:cxnSp>
+        <p:grpSp>
+          <p:nvGrpSpPr>
+            <p:cNvPr id="21" name="Group 20"/>
+            <p:cNvGrpSpPr/>
+            <p:nvPr/>
+          </p:nvGrpSpPr>
+          <p:grpSpPr>
+            <a:xfrm>
+              <a:off x="4300566" y="619125"/>
+              <a:ext cx="1154084" cy="187986"/>
+              <a:chOff x="4300566" y="587375"/>
+              <a:chExt cx="1154084" cy="187986"/>
+            </a:xfrm>
+          </p:grpSpPr>
+          <p:cxnSp>
+            <p:nvCxnSpPr>
+              <p:cNvPr id="3" name="Straight Connector 2"/>
+              <p:cNvCxnSpPr/>
+              <p:nvPr/>
+            </p:nvCxnSpPr>
+            <p:spPr>
+              <a:xfrm>
+                <a:off x="4300566" y="681368"/>
+                <a:ext cx="1154084" cy="0"/>
+              </a:xfrm>
+              <a:prstGeom prst="line">
+                <a:avLst/>
+              </a:prstGeom>
+              <a:ln w="38100"/>
+            </p:spPr>
+            <p:style>
+              <a:lnRef idx="1">
+                <a:schemeClr val="accent2"/>
+              </a:lnRef>
+              <a:fillRef idx="0">
+                <a:schemeClr val="accent2"/>
+              </a:fillRef>
+              <a:effectRef idx="0">
+                <a:schemeClr val="accent2"/>
+              </a:effectRef>
+              <a:fontRef idx="minor">
+                <a:schemeClr val="tx1"/>
+              </a:fontRef>
+            </p:style>
+          </p:cxnSp>
+          <p:cxnSp>
+            <p:nvCxnSpPr>
+              <p:cNvPr id="14" name="Straight Connector 13"/>
+              <p:cNvCxnSpPr/>
+              <p:nvPr/>
+            </p:nvCxnSpPr>
+            <p:spPr>
+              <a:xfrm>
+                <a:off x="4300566" y="587375"/>
+                <a:ext cx="0" cy="187986"/>
+              </a:xfrm>
+              <a:prstGeom prst="line">
+                <a:avLst/>
+              </a:prstGeom>
+              <a:ln w="28575"/>
+            </p:spPr>
+            <p:style>
+              <a:lnRef idx="1">
+                <a:schemeClr val="accent2"/>
+              </a:lnRef>
+              <a:fillRef idx="0">
+                <a:schemeClr val="accent2"/>
+              </a:fillRef>
+              <a:effectRef idx="0">
+                <a:schemeClr val="accent2"/>
+              </a:effectRef>
+              <a:fontRef idx="minor">
+                <a:schemeClr val="tx1"/>
+              </a:fontRef>
+            </p:style>
+          </p:cxnSp>
+        </p:grpSp>
+        <p:grpSp>
+          <p:nvGrpSpPr>
+            <p:cNvPr id="30" name="Group 29"/>
+            <p:cNvGrpSpPr/>
+            <p:nvPr/>
+          </p:nvGrpSpPr>
+          <p:grpSpPr>
+            <a:xfrm>
+              <a:off x="4225441" y="431139"/>
+              <a:ext cx="1229209" cy="187986"/>
+              <a:chOff x="4300566" y="587375"/>
+              <a:chExt cx="1229209" cy="187986"/>
+            </a:xfrm>
+          </p:grpSpPr>
+          <p:cxnSp>
+            <p:nvCxnSpPr>
+              <p:cNvPr id="32" name="Straight Connector 31"/>
+              <p:cNvCxnSpPr/>
+              <p:nvPr/>
+            </p:nvCxnSpPr>
+            <p:spPr>
+              <a:xfrm>
+                <a:off x="4300566" y="681368"/>
+                <a:ext cx="1229209" cy="0"/>
+              </a:xfrm>
+              <a:prstGeom prst="line">
+                <a:avLst/>
+              </a:prstGeom>
+              <a:ln w="38100">
+                <a:solidFill>
+                  <a:schemeClr val="accent1"/>
+                </a:solidFill>
+              </a:ln>
+            </p:spPr>
+            <p:style>
+              <a:lnRef idx="1">
+                <a:schemeClr val="accent2"/>
+              </a:lnRef>
+              <a:fillRef idx="0">
+                <a:schemeClr val="accent2"/>
+              </a:fillRef>
+              <a:effectRef idx="0">
+                <a:schemeClr val="accent2"/>
+              </a:effectRef>
+              <a:fontRef idx="minor">
+                <a:schemeClr val="tx1"/>
+              </a:fontRef>
+            </p:style>
+          </p:cxnSp>
+          <p:cxnSp>
+            <p:nvCxnSpPr>
+              <p:cNvPr id="38" name="Straight Connector 37"/>
+              <p:cNvCxnSpPr/>
+              <p:nvPr/>
+            </p:nvCxnSpPr>
+            <p:spPr>
+              <a:xfrm>
+                <a:off x="4300566" y="587375"/>
+                <a:ext cx="0" cy="187986"/>
+              </a:xfrm>
+              <a:prstGeom prst="line">
+                <a:avLst/>
+              </a:prstGeom>
+              <a:ln w="28575">
+                <a:solidFill>
+                  <a:schemeClr val="accent1"/>
+                </a:solidFill>
+              </a:ln>
+            </p:spPr>
+            <p:style>
+              <a:lnRef idx="1">
+                <a:schemeClr val="accent2"/>
+              </a:lnRef>
+              <a:fillRef idx="0">
+                <a:schemeClr val="accent2"/>
+              </a:fillRef>
+              <a:effectRef idx="0">
+                <a:schemeClr val="accent2"/>
+              </a:effectRef>
+              <a:fontRef idx="minor">
+                <a:schemeClr val="tx1"/>
+              </a:fontRef>
+            </p:style>
+          </p:cxnSp>
+        </p:grpSp>
+        <p:cxnSp>
+          <p:nvCxnSpPr>
+            <p:cNvPr id="39" name="Straight Connector 38">
+              <a:extLst>
+                <a:ext uri="{FF2B5EF4-FFF2-40B4-BE49-F238E27FC236}">
+                  <a16:creationId xmlns:a16="http://schemas.microsoft.com/office/drawing/2014/main" id="{BAA7B587-28D0-C841-972B-AD72B5536FE9}"/>
+                </a:ext>
+              </a:extLst>
+            </p:cNvPr>
+            <p:cNvCxnSpPr>
+              <a:cxnSpLocks/>
+            </p:cNvCxnSpPr>
+            <p:nvPr/>
+          </p:nvCxnSpPr>
+          <p:spPr>
+            <a:xfrm>
+              <a:off x="4300566" y="807110"/>
+              <a:ext cx="0" cy="1075745"/>
+            </a:xfrm>
+            <a:prstGeom prst="line">
+              <a:avLst/>
+            </a:prstGeom>
+            <a:ln w="19050">
+              <a:solidFill>
+                <a:schemeClr val="accent2"/>
+              </a:solidFill>
+              <a:prstDash val="sysDash"/>
+            </a:ln>
+          </p:spPr>
+          <p:style>
+            <a:lnRef idx="1">
+              <a:schemeClr val="accent1"/>
+            </a:lnRef>
+            <a:fillRef idx="0">
+              <a:schemeClr val="accent1"/>
+            </a:fillRef>
+            <a:effectRef idx="0">
+              <a:schemeClr val="accent1"/>
+            </a:effectRef>
+            <a:fontRef idx="minor">
+              <a:schemeClr val="tx1"/>
+            </a:fontRef>
+          </p:style>
+        </p:cxnSp>
+        <p:sp>
+          <p:nvSpPr>
+            <p:cNvPr id="60" name="TextBox 59"/>
+            <p:cNvSpPr txBox="1"/>
+            <p:nvPr/>
+          </p:nvSpPr>
+          <p:spPr>
+            <a:xfrm>
+              <a:off x="5399482" y="571513"/>
+              <a:ext cx="413896" cy="261610"/>
+            </a:xfrm>
+            <a:prstGeom prst="rect">
+              <a:avLst/>
+            </a:prstGeom>
+            <a:noFill/>
+          </p:spPr>
+          <p:txBody>
+            <a:bodyPr wrap="none" rtlCol="0">
+              <a:spAutoFit/>
+            </a:bodyPr>
+            <a:lstStyle/>
+            <a:p>
+              <a:r>
+                <a:rPr lang="nl-NL" sz="1100" dirty="0" smtClean="0">
+                  <a:solidFill>
+                    <a:schemeClr val="accent2"/>
+                  </a:solidFill>
+                </a:rPr>
+                <a:t>TH2</a:t>
+              </a:r>
+              <a:endParaRPr lang="en-US" sz="1100" dirty="0">
+                <a:solidFill>
+                  <a:schemeClr val="accent2"/>
+                </a:solidFill>
+              </a:endParaRPr>
+            </a:p>
+          </p:txBody>
+        </p:sp>
+        <p:sp>
+          <p:nvSpPr>
+            <p:cNvPr id="61" name="TextBox 60"/>
+            <p:cNvSpPr txBox="1"/>
+            <p:nvPr/>
+          </p:nvSpPr>
+          <p:spPr>
+            <a:xfrm>
+              <a:off x="5395977" y="404308"/>
+              <a:ext cx="413896" cy="261610"/>
+            </a:xfrm>
+            <a:prstGeom prst="rect">
+              <a:avLst/>
+            </a:prstGeom>
+            <a:noFill/>
+          </p:spPr>
+          <p:txBody>
+            <a:bodyPr wrap="none" rtlCol="0">
+              <a:spAutoFit/>
+            </a:bodyPr>
+            <a:lstStyle/>
+            <a:p>
+              <a:r>
+                <a:rPr lang="nl-NL" sz="1100" dirty="0" smtClean="0">
+                  <a:solidFill>
+                    <a:schemeClr val="accent1"/>
+                  </a:solidFill>
+                </a:rPr>
+                <a:t>TH1</a:t>
+              </a:r>
+              <a:endParaRPr lang="en-US" sz="1100" dirty="0">
+                <a:solidFill>
+                  <a:schemeClr val="accent1"/>
+                </a:solidFill>
+              </a:endParaRPr>
+            </a:p>
+          </p:txBody>
+        </p:sp>
+      </p:grpSp>
+      <p:sp>
+        <p:nvSpPr>
+          <p:cNvPr id="62" name="TextBox 61"/>
+          <p:cNvSpPr txBox="1"/>
+          <p:nvPr/>
+        </p:nvSpPr>
+        <p:spPr>
+          <a:xfrm>
+            <a:off x="428456" y="853653"/>
+            <a:ext cx="2608114" cy="369332"/>
+          </a:xfrm>
+          <a:prstGeom prst="rect">
+            <a:avLst/>
+          </a:prstGeom>
+          <a:noFill/>
+        </p:spPr>
+        <p:txBody>
+          <a:bodyPr wrap="square" rtlCol="0">
+            <a:spAutoFit/>
+          </a:bodyPr>
+          <a:lstStyle/>
+          <a:p>
+            <a:pPr algn="ctr"/>
+            <a:r>
+              <a:rPr lang="nl-NL" dirty="0" smtClean="0"/>
+              <a:t>Raw image</a:t>
+            </a:r>
+            <a:endParaRPr lang="en-US" dirty="0"/>
+          </a:p>
+        </p:txBody>
+      </p:sp>
+    </p:spTree>
+    <p:extLst>
+      <p:ext uri="{BB962C8B-B14F-4D97-AF65-F5344CB8AC3E}">
+        <p14:creationId xmlns:p14="http://schemas.microsoft.com/office/powerpoint/2010/main" val="3142590149"/>
+      </p:ext>
+    </p:extLst>
+  </p:cSld>
+  <p:clrMapOvr>
+    <a:masterClrMapping/>
+  </p:clrMapOvr>
+</p:sld>
+</file>
+
 <file path=ppt/theme/theme1.xml><?xml version="1.0" encoding="utf-8"?>
 <a:theme xmlns:a="http://schemas.openxmlformats.org/drawingml/2006/main" name="Office Theme">
   <a:themeElements>

</xml_diff>

<commit_message>
Init script to automatically create figures, #636
</commit_message>
<xml_diff>
--- a/figures/resources/auto_threshold.pptx
+++ b/figures/resources/auto_threshold.pptx
@@ -5,9 +5,8 @@
     <p:sldMasterId id="2147483648" r:id="rId1"/>
   </p:sldMasterIdLst>
   <p:sldIdLst>
-    <p:sldId id="256" r:id="rId2"/>
+    <p:sldId id="258" r:id="rId2"/>
     <p:sldId id="257" r:id="rId3"/>
-    <p:sldId id="258" r:id="rId4"/>
   </p:sldIdLst>
   <p:sldSz cx="12192000" cy="6858000"/>
   <p:notesSz cx="6858000" cy="9144000"/>
@@ -263,7 +262,7 @@
           <a:p>
             <a:fld id="{A2082E80-D984-8849-B81C-39C6BF0D230A}" type="datetimeFigureOut">
               <a:rPr lang="de-DE" smtClean="0"/>
-              <a:t>08.03.22</a:t>
+              <a:t>31.03.24</a:t>
             </a:fld>
             <a:endParaRPr lang="de-DE"/>
           </a:p>
@@ -463,7 +462,7 @@
           <a:p>
             <a:fld id="{A2082E80-D984-8849-B81C-39C6BF0D230A}" type="datetimeFigureOut">
               <a:rPr lang="de-DE" smtClean="0"/>
-              <a:t>08.03.22</a:t>
+              <a:t>31.03.24</a:t>
             </a:fld>
             <a:endParaRPr lang="de-DE"/>
           </a:p>
@@ -673,7 +672,7 @@
           <a:p>
             <a:fld id="{A2082E80-D984-8849-B81C-39C6BF0D230A}" type="datetimeFigureOut">
               <a:rPr lang="de-DE" smtClean="0"/>
-              <a:t>08.03.22</a:t>
+              <a:t>31.03.24</a:t>
             </a:fld>
             <a:endParaRPr lang="de-DE"/>
           </a:p>
@@ -873,7 +872,7 @@
           <a:p>
             <a:fld id="{A2082E80-D984-8849-B81C-39C6BF0D230A}" type="datetimeFigureOut">
               <a:rPr lang="de-DE" smtClean="0"/>
-              <a:t>08.03.22</a:t>
+              <a:t>31.03.24</a:t>
             </a:fld>
             <a:endParaRPr lang="de-DE"/>
           </a:p>
@@ -1149,7 +1148,7 @@
           <a:p>
             <a:fld id="{A2082E80-D984-8849-B81C-39C6BF0D230A}" type="datetimeFigureOut">
               <a:rPr lang="de-DE" smtClean="0"/>
-              <a:t>08.03.22</a:t>
+              <a:t>31.03.24</a:t>
             </a:fld>
             <a:endParaRPr lang="de-DE"/>
           </a:p>
@@ -1417,7 +1416,7 @@
           <a:p>
             <a:fld id="{A2082E80-D984-8849-B81C-39C6BF0D230A}" type="datetimeFigureOut">
               <a:rPr lang="de-DE" smtClean="0"/>
-              <a:t>08.03.22</a:t>
+              <a:t>31.03.24</a:t>
             </a:fld>
             <a:endParaRPr lang="de-DE"/>
           </a:p>
@@ -1832,7 +1831,7 @@
           <a:p>
             <a:fld id="{A2082E80-D984-8849-B81C-39C6BF0D230A}" type="datetimeFigureOut">
               <a:rPr lang="de-DE" smtClean="0"/>
-              <a:t>08.03.22</a:t>
+              <a:t>31.03.24</a:t>
             </a:fld>
             <a:endParaRPr lang="de-DE"/>
           </a:p>
@@ -1974,7 +1973,7 @@
           <a:p>
             <a:fld id="{A2082E80-D984-8849-B81C-39C6BF0D230A}" type="datetimeFigureOut">
               <a:rPr lang="de-DE" smtClean="0"/>
-              <a:t>08.03.22</a:t>
+              <a:t>31.03.24</a:t>
             </a:fld>
             <a:endParaRPr lang="de-DE"/>
           </a:p>
@@ -2087,7 +2086,7 @@
           <a:p>
             <a:fld id="{A2082E80-D984-8849-B81C-39C6BF0D230A}" type="datetimeFigureOut">
               <a:rPr lang="de-DE" smtClean="0"/>
-              <a:t>08.03.22</a:t>
+              <a:t>31.03.24</a:t>
             </a:fld>
             <a:endParaRPr lang="de-DE"/>
           </a:p>
@@ -2400,7 +2399,7 @@
           <a:p>
             <a:fld id="{A2082E80-D984-8849-B81C-39C6BF0D230A}" type="datetimeFigureOut">
               <a:rPr lang="de-DE" smtClean="0"/>
-              <a:t>08.03.22</a:t>
+              <a:t>31.03.24</a:t>
             </a:fld>
             <a:endParaRPr lang="de-DE"/>
           </a:p>
@@ -2689,7 +2688,7 @@
           <a:p>
             <a:fld id="{A2082E80-D984-8849-B81C-39C6BF0D230A}" type="datetimeFigureOut">
               <a:rPr lang="de-DE" smtClean="0"/>
-              <a:t>08.03.22</a:t>
+              <a:t>31.03.24</a:t>
             </a:fld>
             <a:endParaRPr lang="de-DE"/>
           </a:p>
@@ -2932,7 +2931,7 @@
           <a:p>
             <a:fld id="{A2082E80-D984-8849-B81C-39C6BF0D230A}" type="datetimeFigureOut">
               <a:rPr lang="de-DE" smtClean="0"/>
-              <a:t>08.03.22</a:t>
+              <a:t>31.03.24</a:t>
             </a:fld>
             <a:endParaRPr lang="de-DE"/>
           </a:p>
@@ -3333,1325 +3332,6 @@
 </file>
 
 <file path=ppt/slides/slide1.xml><?xml version="1.0" encoding="utf-8"?>
-<p:sld xmlns:a="http://schemas.openxmlformats.org/drawingml/2006/main" xmlns:r="http://schemas.openxmlformats.org/officeDocument/2006/relationships" xmlns:p="http://schemas.openxmlformats.org/presentationml/2006/main">
-  <p:cSld>
-    <p:spTree>
-      <p:nvGrpSpPr>
-        <p:cNvPr id="1" name=""/>
-        <p:cNvGrpSpPr/>
-        <p:nvPr/>
-      </p:nvGrpSpPr>
-      <p:grpSpPr>
-        <a:xfrm>
-          <a:off x="0" y="0"/>
-          <a:ext cx="0" cy="0"/>
-          <a:chOff x="0" y="0"/>
-          <a:chExt cx="0" cy="0"/>
-        </a:xfrm>
-      </p:grpSpPr>
-      <p:sp>
-        <p:nvSpPr>
-          <p:cNvPr id="2" name="Title 1">
-            <a:extLst>
-              <a:ext uri="{FF2B5EF4-FFF2-40B4-BE49-F238E27FC236}">
-                <a16:creationId xmlns:a16="http://schemas.microsoft.com/office/drawing/2014/main" id="{38C45324-FA28-0449-875B-D4BCEEB1C8B9}"/>
-              </a:ext>
-            </a:extLst>
-          </p:cNvPr>
-          <p:cNvSpPr>
-            <a:spLocks noGrp="1"/>
-          </p:cNvSpPr>
-          <p:nvPr>
-            <p:ph type="ctrTitle"/>
-          </p:nvPr>
-        </p:nvSpPr>
-        <p:spPr/>
-        <p:txBody>
-          <a:bodyPr/>
-          <a:lstStyle/>
-          <a:p>
-            <a:r>
-              <a:rPr lang="de-DE" dirty="0"/>
-              <a:t>Auto </a:t>
-            </a:r>
-            <a:r>
-              <a:rPr lang="de-DE" dirty="0" err="1"/>
-              <a:t>Threshold</a:t>
-            </a:r>
-            <a:endParaRPr lang="de-DE" dirty="0"/>
-          </a:p>
-        </p:txBody>
-      </p:sp>
-      <p:sp>
-        <p:nvSpPr>
-          <p:cNvPr id="3" name="Subtitle 2">
-            <a:extLst>
-              <a:ext uri="{FF2B5EF4-FFF2-40B4-BE49-F238E27FC236}">
-                <a16:creationId xmlns:a16="http://schemas.microsoft.com/office/drawing/2014/main" id="{A451D9AD-2FED-744E-AEBD-DC0150481E7E}"/>
-              </a:ext>
-            </a:extLst>
-          </p:cNvPr>
-          <p:cNvSpPr>
-            <a:spLocks noGrp="1"/>
-          </p:cNvSpPr>
-          <p:nvPr>
-            <p:ph type="subTitle" idx="1"/>
-          </p:nvPr>
-        </p:nvSpPr>
-        <p:spPr/>
-        <p:txBody>
-          <a:bodyPr/>
-          <a:lstStyle/>
-          <a:p>
-            <a:endParaRPr lang="de-DE"/>
-          </a:p>
-        </p:txBody>
-      </p:sp>
-    </p:spTree>
-    <p:extLst>
-      <p:ext uri="{BB962C8B-B14F-4D97-AF65-F5344CB8AC3E}">
-        <p14:creationId xmlns:p14="http://schemas.microsoft.com/office/powerpoint/2010/main" val="2944302458"/>
-      </p:ext>
-    </p:extLst>
-  </p:cSld>
-  <p:clrMapOvr>
-    <a:masterClrMapping/>
-  </p:clrMapOvr>
-</p:sld>
-</file>
-
-<file path=ppt/slides/slide2.xml><?xml version="1.0" encoding="utf-8"?>
-<p:sld xmlns:a="http://schemas.openxmlformats.org/drawingml/2006/main" xmlns:r="http://schemas.openxmlformats.org/officeDocument/2006/relationships" xmlns:p="http://schemas.openxmlformats.org/presentationml/2006/main">
-  <p:cSld>
-    <p:spTree>
-      <p:nvGrpSpPr>
-        <p:cNvPr id="1" name=""/>
-        <p:cNvGrpSpPr/>
-        <p:nvPr/>
-      </p:nvGrpSpPr>
-      <p:grpSpPr>
-        <a:xfrm>
-          <a:off x="0" y="0"/>
-          <a:ext cx="0" cy="0"/>
-          <a:chOff x="0" y="0"/>
-          <a:chExt cx="0" cy="0"/>
-        </a:xfrm>
-      </p:grpSpPr>
-      <p:pic>
-        <p:nvPicPr>
-          <p:cNvPr id="4" name="Picture 3">
-            <a:extLst>
-              <a:ext uri="{FF2B5EF4-FFF2-40B4-BE49-F238E27FC236}">
-                <a16:creationId xmlns:a16="http://schemas.microsoft.com/office/drawing/2014/main" id="{15DD2D88-C847-F642-8820-A3C632BD4E4F}"/>
-              </a:ext>
-            </a:extLst>
-          </p:cNvPr>
-          <p:cNvPicPr>
-            <a:picLocks noChangeAspect="1"/>
-          </p:cNvPicPr>
-          <p:nvPr/>
-        </p:nvPicPr>
-        <p:blipFill>
-          <a:blip r:embed="rId2"/>
-          <a:stretch>
-            <a:fillRect/>
-          </a:stretch>
-        </p:blipFill>
-        <p:spPr>
-          <a:xfrm>
-            <a:off x="613335" y="2251051"/>
-            <a:ext cx="2502099" cy="938287"/>
-          </a:xfrm>
-          <a:prstGeom prst="rect">
-            <a:avLst/>
-          </a:prstGeom>
-        </p:spPr>
-      </p:pic>
-      <p:pic>
-        <p:nvPicPr>
-          <p:cNvPr id="5" name="Picture 4">
-            <a:extLst>
-              <a:ext uri="{FF2B5EF4-FFF2-40B4-BE49-F238E27FC236}">
-                <a16:creationId xmlns:a16="http://schemas.microsoft.com/office/drawing/2014/main" id="{CD280D81-DF66-4A49-A808-0820824C6A39}"/>
-              </a:ext>
-            </a:extLst>
-          </p:cNvPr>
-          <p:cNvPicPr>
-            <a:picLocks noChangeAspect="1"/>
-          </p:cNvPicPr>
-          <p:nvPr/>
-        </p:nvPicPr>
-        <p:blipFill>
-          <a:blip r:embed="rId3"/>
-          <a:stretch>
-            <a:fillRect/>
-          </a:stretch>
-        </p:blipFill>
-        <p:spPr>
-          <a:xfrm>
-            <a:off x="613335" y="921285"/>
-            <a:ext cx="2502099" cy="938287"/>
-          </a:xfrm>
-          <a:prstGeom prst="rect">
-            <a:avLst/>
-          </a:prstGeom>
-        </p:spPr>
-      </p:pic>
-      <p:pic>
-        <p:nvPicPr>
-          <p:cNvPr id="6" name="Picture 5">
-            <a:extLst>
-              <a:ext uri="{FF2B5EF4-FFF2-40B4-BE49-F238E27FC236}">
-                <a16:creationId xmlns:a16="http://schemas.microsoft.com/office/drawing/2014/main" id="{ACFE80AA-4AA5-4F43-B539-1B37947725BC}"/>
-              </a:ext>
-            </a:extLst>
-          </p:cNvPr>
-          <p:cNvPicPr>
-            <a:picLocks noChangeAspect="1"/>
-          </p:cNvPicPr>
-          <p:nvPr/>
-        </p:nvPicPr>
-        <p:blipFill>
-          <a:blip r:embed="rId4"/>
-          <a:stretch>
-            <a:fillRect/>
-          </a:stretch>
-        </p:blipFill>
-        <p:spPr>
-          <a:xfrm>
-            <a:off x="613335" y="3534016"/>
-            <a:ext cx="2502099" cy="938287"/>
-          </a:xfrm>
-          <a:prstGeom prst="rect">
-            <a:avLst/>
-          </a:prstGeom>
-        </p:spPr>
-      </p:pic>
-      <p:pic>
-        <p:nvPicPr>
-          <p:cNvPr id="7" name="Picture 6">
-            <a:extLst>
-              <a:ext uri="{FF2B5EF4-FFF2-40B4-BE49-F238E27FC236}">
-                <a16:creationId xmlns:a16="http://schemas.microsoft.com/office/drawing/2014/main" id="{B312950F-30F8-8342-819B-3439D959D889}"/>
-              </a:ext>
-            </a:extLst>
-          </p:cNvPr>
-          <p:cNvPicPr>
-            <a:picLocks noChangeAspect="1"/>
-          </p:cNvPicPr>
-          <p:nvPr/>
-        </p:nvPicPr>
-        <p:blipFill rotWithShape="1">
-          <a:blip r:embed="rId5"/>
-          <a:srcRect b="30047"/>
-          <a:stretch/>
-        </p:blipFill>
-        <p:spPr>
-          <a:xfrm>
-            <a:off x="3347923" y="734265"/>
-            <a:ext cx="2287838" cy="1312327"/>
-          </a:xfrm>
-          <a:prstGeom prst="rect">
-            <a:avLst/>
-          </a:prstGeom>
-        </p:spPr>
-      </p:pic>
-      <p:pic>
-        <p:nvPicPr>
-          <p:cNvPr id="8" name="Picture 7">
-            <a:extLst>
-              <a:ext uri="{FF2B5EF4-FFF2-40B4-BE49-F238E27FC236}">
-                <a16:creationId xmlns:a16="http://schemas.microsoft.com/office/drawing/2014/main" id="{1D45D401-86BF-5644-8C9C-4FB58FD2DA42}"/>
-              </a:ext>
-            </a:extLst>
-          </p:cNvPr>
-          <p:cNvPicPr>
-            <a:picLocks noChangeAspect="1"/>
-          </p:cNvPicPr>
-          <p:nvPr/>
-        </p:nvPicPr>
-        <p:blipFill rotWithShape="1">
-          <a:blip r:embed="rId6"/>
-          <a:srcRect b="29216"/>
-          <a:stretch/>
-        </p:blipFill>
-        <p:spPr>
-          <a:xfrm>
-            <a:off x="3347923" y="2056225"/>
-            <a:ext cx="2287838" cy="1327938"/>
-          </a:xfrm>
-          <a:prstGeom prst="rect">
-            <a:avLst/>
-          </a:prstGeom>
-        </p:spPr>
-      </p:pic>
-      <p:pic>
-        <p:nvPicPr>
-          <p:cNvPr id="9" name="Picture 8">
-            <a:extLst>
-              <a:ext uri="{FF2B5EF4-FFF2-40B4-BE49-F238E27FC236}">
-                <a16:creationId xmlns:a16="http://schemas.microsoft.com/office/drawing/2014/main" id="{7260EFD8-F196-654E-A935-703FEDA77D03}"/>
-              </a:ext>
-            </a:extLst>
-          </p:cNvPr>
-          <p:cNvPicPr>
-            <a:picLocks noChangeAspect="1"/>
-          </p:cNvPicPr>
-          <p:nvPr/>
-        </p:nvPicPr>
-        <p:blipFill rotWithShape="1">
-          <a:blip r:embed="rId7"/>
-          <a:srcRect b="30333"/>
-          <a:stretch/>
-        </p:blipFill>
-        <p:spPr>
-          <a:xfrm>
-            <a:off x="3347924" y="3414069"/>
-            <a:ext cx="2287837" cy="1306971"/>
-          </a:xfrm>
-          <a:prstGeom prst="rect">
-            <a:avLst/>
-          </a:prstGeom>
-        </p:spPr>
-      </p:pic>
-      <p:sp>
-        <p:nvSpPr>
-          <p:cNvPr id="11" name="Rectangle 10">
-            <a:extLst>
-              <a:ext uri="{FF2B5EF4-FFF2-40B4-BE49-F238E27FC236}">
-                <a16:creationId xmlns:a16="http://schemas.microsoft.com/office/drawing/2014/main" id="{E552DB2A-8498-7641-8278-94712E00FC7F}"/>
-              </a:ext>
-            </a:extLst>
-          </p:cNvPr>
-          <p:cNvSpPr/>
-          <p:nvPr/>
-        </p:nvSpPr>
-        <p:spPr>
-          <a:xfrm>
-            <a:off x="5801133" y="5451377"/>
-            <a:ext cx="1360834" cy="3000821"/>
-          </a:xfrm>
-          <a:prstGeom prst="rect">
-            <a:avLst/>
-          </a:prstGeom>
-        </p:spPr>
-        <p:txBody>
-          <a:bodyPr wrap="square">
-            <a:spAutoFit/>
-          </a:bodyPr>
-          <a:lstStyle/>
-          <a:p>
-            <a:r>
-              <a:rPr lang="de-DE" sz="1050" dirty="0"/>
-              <a:t>xy_8bit__two_bright</a:t>
-            </a:r>
-          </a:p>
-          <a:p>
-            <a:r>
-              <a:rPr lang="de-DE" sz="1050" dirty="0"/>
-              <a:t>Default: 103</a:t>
-            </a:r>
-          </a:p>
-          <a:p>
-            <a:r>
-              <a:rPr lang="de-DE" sz="1050" b="1" dirty="0"/>
-              <a:t>Huang: 81</a:t>
-            </a:r>
-          </a:p>
-          <a:p>
-            <a:r>
-              <a:rPr lang="de-DE" sz="1050" dirty="0"/>
-              <a:t>Huang2: 86</a:t>
-            </a:r>
-          </a:p>
-          <a:p>
-            <a:r>
-              <a:rPr lang="de-DE" sz="1050" dirty="0" err="1"/>
-              <a:t>Intermodes</a:t>
-            </a:r>
-            <a:r>
-              <a:rPr lang="de-DE" sz="1050" dirty="0"/>
-              <a:t>: 110</a:t>
-            </a:r>
-          </a:p>
-          <a:p>
-            <a:r>
-              <a:rPr lang="de-DE" sz="1050" dirty="0" err="1"/>
-              <a:t>IsoData</a:t>
-            </a:r>
-            <a:r>
-              <a:rPr lang="de-DE" sz="1050" dirty="0"/>
-              <a:t>: 103</a:t>
-            </a:r>
-          </a:p>
-          <a:p>
-            <a:r>
-              <a:rPr lang="de-DE" sz="1050" dirty="0"/>
-              <a:t>Li: 64</a:t>
-            </a:r>
-          </a:p>
-          <a:p>
-            <a:r>
-              <a:rPr lang="de-DE" sz="1050" dirty="0" err="1"/>
-              <a:t>MaxEntropy</a:t>
-            </a:r>
-            <a:r>
-              <a:rPr lang="de-DE" sz="1050" dirty="0"/>
-              <a:t>: 49</a:t>
-            </a:r>
-          </a:p>
-          <a:p>
-            <a:r>
-              <a:rPr lang="de-DE" sz="1050" dirty="0" err="1"/>
-              <a:t>Mean</a:t>
-            </a:r>
-            <a:r>
-              <a:rPr lang="de-DE" sz="1050" dirty="0"/>
-              <a:t>: 62</a:t>
-            </a:r>
-          </a:p>
-          <a:p>
-            <a:r>
-              <a:rPr lang="de-DE" sz="1050" dirty="0" err="1"/>
-              <a:t>MinError</a:t>
-            </a:r>
-            <a:r>
-              <a:rPr lang="de-DE" sz="1050" dirty="0"/>
-              <a:t>(I): 23</a:t>
-            </a:r>
-          </a:p>
-          <a:p>
-            <a:r>
-              <a:rPr lang="de-DE" sz="1050" dirty="0"/>
-              <a:t>Minimum: 111</a:t>
-            </a:r>
-          </a:p>
-          <a:p>
-            <a:r>
-              <a:rPr lang="de-DE" sz="1050" dirty="0"/>
-              <a:t>Moments: 103</a:t>
-            </a:r>
-          </a:p>
-          <a:p>
-            <a:r>
-              <a:rPr lang="de-DE" sz="1050" b="1" dirty="0"/>
-              <a:t>Otsu: 103</a:t>
-            </a:r>
-          </a:p>
-          <a:p>
-            <a:r>
-              <a:rPr lang="de-DE" sz="1050" dirty="0" err="1"/>
-              <a:t>Percentile</a:t>
-            </a:r>
-            <a:r>
-              <a:rPr lang="de-DE" sz="1050" dirty="0"/>
-              <a:t>: 14</a:t>
-            </a:r>
-          </a:p>
-          <a:p>
-            <a:r>
-              <a:rPr lang="de-DE" sz="1050" dirty="0" err="1"/>
-              <a:t>RenyiEntropy</a:t>
-            </a:r>
-            <a:r>
-              <a:rPr lang="de-DE" sz="1050" dirty="0"/>
-              <a:t>: 45</a:t>
-            </a:r>
-          </a:p>
-          <a:p>
-            <a:r>
-              <a:rPr lang="de-DE" sz="1050" dirty="0" err="1"/>
-              <a:t>Shanbhag</a:t>
-            </a:r>
-            <a:r>
-              <a:rPr lang="de-DE" sz="1050" dirty="0"/>
-              <a:t>: 169</a:t>
-            </a:r>
-          </a:p>
-          <a:p>
-            <a:r>
-              <a:rPr lang="de-DE" sz="1050" dirty="0" err="1"/>
-              <a:t>Triangle</a:t>
-            </a:r>
-            <a:r>
-              <a:rPr lang="de-DE" sz="1050" dirty="0"/>
-              <a:t>: 30</a:t>
-            </a:r>
-          </a:p>
-          <a:p>
-            <a:r>
-              <a:rPr lang="de-DE" sz="1050" dirty="0"/>
-              <a:t>Yen: 23</a:t>
-            </a:r>
-          </a:p>
-        </p:txBody>
-      </p:sp>
-      <p:sp>
-        <p:nvSpPr>
-          <p:cNvPr id="12" name="Rectangle 11">
-            <a:extLst>
-              <a:ext uri="{FF2B5EF4-FFF2-40B4-BE49-F238E27FC236}">
-                <a16:creationId xmlns:a16="http://schemas.microsoft.com/office/drawing/2014/main" id="{E2107B69-0801-8442-82D0-1923A6122041}"/>
-              </a:ext>
-            </a:extLst>
-          </p:cNvPr>
-          <p:cNvSpPr/>
-          <p:nvPr/>
-        </p:nvSpPr>
-        <p:spPr>
-          <a:xfrm>
-            <a:off x="8931957" y="5451377"/>
-            <a:ext cx="1592195" cy="3000821"/>
-          </a:xfrm>
-          <a:prstGeom prst="rect">
-            <a:avLst/>
-          </a:prstGeom>
-        </p:spPr>
-        <p:txBody>
-          <a:bodyPr wrap="square">
-            <a:spAutoFit/>
-          </a:bodyPr>
-          <a:lstStyle/>
-          <a:p>
-            <a:r>
-              <a:rPr lang="de-DE" sz="1050" dirty="0"/>
-              <a:t>xy_8bit__just_noise</a:t>
-            </a:r>
-          </a:p>
-          <a:p>
-            <a:r>
-              <a:rPr lang="de-DE" sz="1050" dirty="0"/>
-              <a:t>Default: 9</a:t>
-            </a:r>
-          </a:p>
-          <a:p>
-            <a:r>
-              <a:rPr lang="de-DE" sz="1050" b="1" dirty="0"/>
-              <a:t>Huang: 9</a:t>
-            </a:r>
-          </a:p>
-          <a:p>
-            <a:r>
-              <a:rPr lang="de-DE" sz="1050" dirty="0"/>
-              <a:t>Huang2: 10</a:t>
-            </a:r>
-          </a:p>
-          <a:p>
-            <a:r>
-              <a:rPr lang="de-DE" sz="1050" dirty="0" err="1"/>
-              <a:t>Intermodes</a:t>
-            </a:r>
-            <a:r>
-              <a:rPr lang="de-DE" sz="1050" dirty="0"/>
-              <a:t>: 20</a:t>
-            </a:r>
-          </a:p>
-          <a:p>
-            <a:r>
-              <a:rPr lang="de-DE" sz="1050" dirty="0" err="1"/>
-              <a:t>IsoData</a:t>
-            </a:r>
-            <a:r>
-              <a:rPr lang="de-DE" sz="1050" dirty="0"/>
-              <a:t>: 9</a:t>
-            </a:r>
-          </a:p>
-          <a:p>
-            <a:r>
-              <a:rPr lang="de-DE" sz="1050" dirty="0"/>
-              <a:t>Li: 10</a:t>
-            </a:r>
-          </a:p>
-          <a:p>
-            <a:r>
-              <a:rPr lang="de-DE" sz="1050" dirty="0" err="1"/>
-              <a:t>MaxEntropy</a:t>
-            </a:r>
-            <a:r>
-              <a:rPr lang="de-DE" sz="1050" dirty="0"/>
-              <a:t>: 15</a:t>
-            </a:r>
-          </a:p>
-          <a:p>
-            <a:r>
-              <a:rPr lang="de-DE" sz="1050" dirty="0" err="1"/>
-              <a:t>Mean</a:t>
-            </a:r>
-            <a:r>
-              <a:rPr lang="de-DE" sz="1050" dirty="0"/>
-              <a:t>: 10</a:t>
-            </a:r>
-          </a:p>
-          <a:p>
-            <a:r>
-              <a:rPr lang="de-DE" sz="1050" dirty="0" err="1"/>
-              <a:t>MinError</a:t>
-            </a:r>
-            <a:r>
-              <a:rPr lang="de-DE" sz="1050" dirty="0"/>
-              <a:t>(I): 10</a:t>
-            </a:r>
-          </a:p>
-          <a:p>
-            <a:r>
-              <a:rPr lang="de-DE" sz="1050" dirty="0"/>
-              <a:t>Minimum: 28</a:t>
-            </a:r>
-          </a:p>
-          <a:p>
-            <a:r>
-              <a:rPr lang="de-DE" sz="1050" dirty="0"/>
-              <a:t>Moments: 11</a:t>
-            </a:r>
-          </a:p>
-          <a:p>
-            <a:r>
-              <a:rPr lang="de-DE" sz="1050" b="1" dirty="0"/>
-              <a:t>Otsu: 10</a:t>
-            </a:r>
-          </a:p>
-          <a:p>
-            <a:r>
-              <a:rPr lang="de-DE" sz="1050" dirty="0" err="1"/>
-              <a:t>Percentile</a:t>
-            </a:r>
-            <a:r>
-              <a:rPr lang="de-DE" sz="1050" dirty="0"/>
-              <a:t>: 10</a:t>
-            </a:r>
-          </a:p>
-          <a:p>
-            <a:r>
-              <a:rPr lang="de-DE" sz="1050" dirty="0" err="1"/>
-              <a:t>RenyiEntropy</a:t>
-            </a:r>
-            <a:r>
-              <a:rPr lang="de-DE" sz="1050" dirty="0"/>
-              <a:t>: 15</a:t>
-            </a:r>
-          </a:p>
-          <a:p>
-            <a:r>
-              <a:rPr lang="de-DE" sz="1050" dirty="0" err="1"/>
-              <a:t>Shanbhag</a:t>
-            </a:r>
-            <a:r>
-              <a:rPr lang="de-DE" sz="1050" dirty="0"/>
-              <a:t>: 10</a:t>
-            </a:r>
-          </a:p>
-          <a:p>
-            <a:r>
-              <a:rPr lang="de-DE" sz="1050" dirty="0" err="1"/>
-              <a:t>Triangle</a:t>
-            </a:r>
-            <a:r>
-              <a:rPr lang="de-DE" sz="1050" dirty="0"/>
-              <a:t>: 21</a:t>
-            </a:r>
-          </a:p>
-          <a:p>
-            <a:r>
-              <a:rPr lang="de-DE" sz="1050" dirty="0"/>
-              <a:t>Yen: 15</a:t>
-            </a:r>
-          </a:p>
-        </p:txBody>
-      </p:sp>
-      <p:sp>
-        <p:nvSpPr>
-          <p:cNvPr id="13" name="Rectangle 12">
-            <a:extLst>
-              <a:ext uri="{FF2B5EF4-FFF2-40B4-BE49-F238E27FC236}">
-                <a16:creationId xmlns:a16="http://schemas.microsoft.com/office/drawing/2014/main" id="{A451AAC5-E118-2846-B256-A9A6FCCB849A}"/>
-              </a:ext>
-            </a:extLst>
-          </p:cNvPr>
-          <p:cNvSpPr/>
-          <p:nvPr/>
-        </p:nvSpPr>
-        <p:spPr>
-          <a:xfrm>
-            <a:off x="7161967" y="5451377"/>
-            <a:ext cx="2001351" cy="3000821"/>
-          </a:xfrm>
-          <a:prstGeom prst="rect">
-            <a:avLst/>
-          </a:prstGeom>
-        </p:spPr>
-        <p:txBody>
-          <a:bodyPr wrap="square">
-            <a:spAutoFit/>
-          </a:bodyPr>
-          <a:lstStyle/>
-          <a:p>
-            <a:r>
-              <a:rPr lang="de-DE" sz="1050" dirty="0"/>
-              <a:t>xy_8bit__two_bright_one_dark</a:t>
-            </a:r>
-          </a:p>
-          <a:p>
-            <a:r>
-              <a:rPr lang="de-DE" sz="1050" dirty="0"/>
-              <a:t>Default: 111</a:t>
-            </a:r>
-          </a:p>
-          <a:p>
-            <a:r>
-              <a:rPr lang="de-DE" sz="1050" b="1" dirty="0"/>
-              <a:t>Huang: 55</a:t>
-            </a:r>
-          </a:p>
-          <a:p>
-            <a:r>
-              <a:rPr lang="de-DE" sz="1050" dirty="0"/>
-              <a:t>Huang2: 58</a:t>
-            </a:r>
-          </a:p>
-          <a:p>
-            <a:r>
-              <a:rPr lang="de-DE" sz="1050" dirty="0" err="1"/>
-              <a:t>Intermodes</a:t>
-            </a:r>
-            <a:r>
-              <a:rPr lang="de-DE" sz="1050" dirty="0"/>
-              <a:t>: 113</a:t>
-            </a:r>
-          </a:p>
-          <a:p>
-            <a:r>
-              <a:rPr lang="de-DE" sz="1050" dirty="0" err="1"/>
-              <a:t>IsoData</a:t>
-            </a:r>
-            <a:r>
-              <a:rPr lang="de-DE" sz="1050" dirty="0"/>
-              <a:t>: 111</a:t>
-            </a:r>
-          </a:p>
-          <a:p>
-            <a:r>
-              <a:rPr lang="de-DE" sz="1050" dirty="0"/>
-              <a:t>Li: 61</a:t>
-            </a:r>
-          </a:p>
-          <a:p>
-            <a:r>
-              <a:rPr lang="de-DE" sz="1050" dirty="0" err="1"/>
-              <a:t>MaxEntropy</a:t>
-            </a:r>
-            <a:r>
-              <a:rPr lang="de-DE" sz="1050" dirty="0"/>
-              <a:t>: 90</a:t>
-            </a:r>
-          </a:p>
-          <a:p>
-            <a:r>
-              <a:rPr lang="de-DE" sz="1050" dirty="0" err="1"/>
-              <a:t>Mean</a:t>
-            </a:r>
-            <a:r>
-              <a:rPr lang="de-DE" sz="1050" dirty="0"/>
-              <a:t>: 72</a:t>
-            </a:r>
-          </a:p>
-          <a:p>
-            <a:r>
-              <a:rPr lang="de-DE" sz="1050" dirty="0" err="1"/>
-              <a:t>MinError</a:t>
-            </a:r>
-            <a:r>
-              <a:rPr lang="de-DE" sz="1050" dirty="0"/>
-              <a:t>(I): 21</a:t>
-            </a:r>
-          </a:p>
-          <a:p>
-            <a:r>
-              <a:rPr lang="de-DE" sz="1050" dirty="0"/>
-              <a:t>Minimum: 140</a:t>
-            </a:r>
-          </a:p>
-          <a:p>
-            <a:r>
-              <a:rPr lang="de-DE" sz="1050" dirty="0"/>
-              <a:t>Moments: 88</a:t>
-            </a:r>
-          </a:p>
-          <a:p>
-            <a:r>
-              <a:rPr lang="de-DE" sz="1050" b="1" dirty="0"/>
-              <a:t>Otsu: 111</a:t>
-            </a:r>
-          </a:p>
-          <a:p>
-            <a:r>
-              <a:rPr lang="de-DE" sz="1050" dirty="0" err="1"/>
-              <a:t>Percentile</a:t>
-            </a:r>
-            <a:r>
-              <a:rPr lang="de-DE" sz="1050" dirty="0"/>
-              <a:t>: 30</a:t>
-            </a:r>
-          </a:p>
-          <a:p>
-            <a:r>
-              <a:rPr lang="de-DE" sz="1050" dirty="0" err="1"/>
-              <a:t>RenyiEntropy</a:t>
-            </a:r>
-            <a:r>
-              <a:rPr lang="de-DE" sz="1050" dirty="0"/>
-              <a:t>: 60</a:t>
-            </a:r>
-          </a:p>
-          <a:p>
-            <a:r>
-              <a:rPr lang="de-DE" sz="1050" dirty="0" err="1"/>
-              <a:t>Shanbhag</a:t>
-            </a:r>
-            <a:r>
-              <a:rPr lang="de-DE" sz="1050" dirty="0"/>
-              <a:t>: 110</a:t>
-            </a:r>
-          </a:p>
-          <a:p>
-            <a:r>
-              <a:rPr lang="de-DE" sz="1050" dirty="0" err="1"/>
-              <a:t>Triangle</a:t>
-            </a:r>
-            <a:r>
-              <a:rPr lang="de-DE" sz="1050" dirty="0"/>
-              <a:t>: 29</a:t>
-            </a:r>
-          </a:p>
-          <a:p>
-            <a:r>
-              <a:rPr lang="de-DE" sz="1050" dirty="0"/>
-              <a:t>Yen: 45</a:t>
-            </a:r>
-          </a:p>
-        </p:txBody>
-      </p:sp>
-      <p:pic>
-        <p:nvPicPr>
-          <p:cNvPr id="15" name="Picture 14">
-            <a:extLst>
-              <a:ext uri="{FF2B5EF4-FFF2-40B4-BE49-F238E27FC236}">
-                <a16:creationId xmlns:a16="http://schemas.microsoft.com/office/drawing/2014/main" id="{65C659A7-583D-C04A-9FD5-D9D56E6A9261}"/>
-              </a:ext>
-            </a:extLst>
-          </p:cNvPr>
-          <p:cNvPicPr>
-            <a:picLocks noChangeAspect="1"/>
-          </p:cNvPicPr>
-          <p:nvPr/>
-        </p:nvPicPr>
-        <p:blipFill>
-          <a:blip r:embed="rId8"/>
-          <a:stretch>
-            <a:fillRect/>
-          </a:stretch>
-        </p:blipFill>
-        <p:spPr>
-          <a:xfrm>
-            <a:off x="5809873" y="3503429"/>
-            <a:ext cx="2626283" cy="984856"/>
-          </a:xfrm>
-          <a:prstGeom prst="rect">
-            <a:avLst/>
-          </a:prstGeom>
-        </p:spPr>
-      </p:pic>
-      <p:pic>
-        <p:nvPicPr>
-          <p:cNvPr id="16" name="Picture 15">
-            <a:extLst>
-              <a:ext uri="{FF2B5EF4-FFF2-40B4-BE49-F238E27FC236}">
-                <a16:creationId xmlns:a16="http://schemas.microsoft.com/office/drawing/2014/main" id="{EF3B66AD-3B79-6747-81E2-7AE807D3BCF6}"/>
-              </a:ext>
-            </a:extLst>
-          </p:cNvPr>
-          <p:cNvPicPr>
-            <a:picLocks noChangeAspect="1"/>
-          </p:cNvPicPr>
-          <p:nvPr/>
-        </p:nvPicPr>
-        <p:blipFill>
-          <a:blip r:embed="rId9"/>
-          <a:stretch>
-            <a:fillRect/>
-          </a:stretch>
-        </p:blipFill>
-        <p:spPr>
-          <a:xfrm>
-            <a:off x="8573479" y="3514138"/>
-            <a:ext cx="2608114" cy="978043"/>
-          </a:xfrm>
-          <a:prstGeom prst="rect">
-            <a:avLst/>
-          </a:prstGeom>
-        </p:spPr>
-      </p:pic>
-      <p:pic>
-        <p:nvPicPr>
-          <p:cNvPr id="17" name="Picture 16">
-            <a:extLst>
-              <a:ext uri="{FF2B5EF4-FFF2-40B4-BE49-F238E27FC236}">
-                <a16:creationId xmlns:a16="http://schemas.microsoft.com/office/drawing/2014/main" id="{603AE2B9-DDD4-D940-80C9-1786CD7D57A2}"/>
-              </a:ext>
-            </a:extLst>
-          </p:cNvPr>
-          <p:cNvPicPr>
-            <a:picLocks noChangeAspect="1"/>
-          </p:cNvPicPr>
-          <p:nvPr/>
-        </p:nvPicPr>
-        <p:blipFill>
-          <a:blip r:embed="rId10"/>
-          <a:stretch>
-            <a:fillRect/>
-          </a:stretch>
-        </p:blipFill>
-        <p:spPr>
-          <a:xfrm>
-            <a:off x="5809873" y="898000"/>
-            <a:ext cx="2626283" cy="984856"/>
-          </a:xfrm>
-          <a:prstGeom prst="rect">
-            <a:avLst/>
-          </a:prstGeom>
-        </p:spPr>
-      </p:pic>
-      <p:pic>
-        <p:nvPicPr>
-          <p:cNvPr id="18" name="Picture 17">
-            <a:extLst>
-              <a:ext uri="{FF2B5EF4-FFF2-40B4-BE49-F238E27FC236}">
-                <a16:creationId xmlns:a16="http://schemas.microsoft.com/office/drawing/2014/main" id="{1EB7C462-FC3B-C545-9592-4156DD351191}"/>
-              </a:ext>
-            </a:extLst>
-          </p:cNvPr>
-          <p:cNvPicPr>
-            <a:picLocks noChangeAspect="1"/>
-          </p:cNvPicPr>
-          <p:nvPr/>
-        </p:nvPicPr>
-        <p:blipFill>
-          <a:blip r:embed="rId11"/>
-          <a:stretch>
-            <a:fillRect/>
-          </a:stretch>
-        </p:blipFill>
-        <p:spPr>
-          <a:xfrm>
-            <a:off x="8573479" y="898000"/>
-            <a:ext cx="2626283" cy="984856"/>
-          </a:xfrm>
-          <a:prstGeom prst="rect">
-            <a:avLst/>
-          </a:prstGeom>
-        </p:spPr>
-      </p:pic>
-      <p:pic>
-        <p:nvPicPr>
-          <p:cNvPr id="19" name="Picture 18">
-            <a:extLst>
-              <a:ext uri="{FF2B5EF4-FFF2-40B4-BE49-F238E27FC236}">
-                <a16:creationId xmlns:a16="http://schemas.microsoft.com/office/drawing/2014/main" id="{411F920C-8498-224A-A2B3-24F8FBF9A054}"/>
-              </a:ext>
-            </a:extLst>
-          </p:cNvPr>
-          <p:cNvPicPr>
-            <a:picLocks noChangeAspect="1"/>
-          </p:cNvPicPr>
-          <p:nvPr/>
-        </p:nvPicPr>
-        <p:blipFill>
-          <a:blip r:embed="rId12"/>
-          <a:stretch>
-            <a:fillRect/>
-          </a:stretch>
-        </p:blipFill>
-        <p:spPr>
-          <a:xfrm>
-            <a:off x="5809873" y="2227766"/>
-            <a:ext cx="2626283" cy="984856"/>
-          </a:xfrm>
-          <a:prstGeom prst="rect">
-            <a:avLst/>
-          </a:prstGeom>
-        </p:spPr>
-      </p:pic>
-      <p:pic>
-        <p:nvPicPr>
-          <p:cNvPr id="20" name="Picture 19">
-            <a:extLst>
-              <a:ext uri="{FF2B5EF4-FFF2-40B4-BE49-F238E27FC236}">
-                <a16:creationId xmlns:a16="http://schemas.microsoft.com/office/drawing/2014/main" id="{0E1A0B80-0074-A245-9BC4-F2B33C1AD887}"/>
-              </a:ext>
-            </a:extLst>
-          </p:cNvPr>
-          <p:cNvPicPr>
-            <a:picLocks noChangeAspect="1"/>
-          </p:cNvPicPr>
-          <p:nvPr/>
-        </p:nvPicPr>
-        <p:blipFill>
-          <a:blip r:embed="rId13"/>
-          <a:stretch>
-            <a:fillRect/>
-          </a:stretch>
-        </p:blipFill>
-        <p:spPr>
-          <a:xfrm>
-            <a:off x="8573479" y="2227766"/>
-            <a:ext cx="2626283" cy="984856"/>
-          </a:xfrm>
-          <a:prstGeom prst="rect">
-            <a:avLst/>
-          </a:prstGeom>
-        </p:spPr>
-      </p:pic>
-      <p:cxnSp>
-        <p:nvCxnSpPr>
-          <p:cNvPr id="22" name="Straight Connector 21">
-            <a:extLst>
-              <a:ext uri="{FF2B5EF4-FFF2-40B4-BE49-F238E27FC236}">
-                <a16:creationId xmlns:a16="http://schemas.microsoft.com/office/drawing/2014/main" id="{BAA7B587-28D0-C841-972B-AD72B5536FE9}"/>
-              </a:ext>
-            </a:extLst>
-          </p:cNvPr>
-          <p:cNvCxnSpPr>
-            <a:cxnSpLocks/>
-          </p:cNvCxnSpPr>
-          <p:nvPr/>
-        </p:nvCxnSpPr>
-        <p:spPr>
-          <a:xfrm>
-            <a:off x="4225441" y="743898"/>
-            <a:ext cx="0" cy="1312327"/>
-          </a:xfrm>
-          <a:prstGeom prst="line">
-            <a:avLst/>
-          </a:prstGeom>
-          <a:ln w="31750"/>
-        </p:spPr>
-        <p:style>
-          <a:lnRef idx="1">
-            <a:schemeClr val="accent1"/>
-          </a:lnRef>
-          <a:fillRef idx="0">
-            <a:schemeClr val="accent1"/>
-          </a:fillRef>
-          <a:effectRef idx="0">
-            <a:schemeClr val="accent1"/>
-          </a:effectRef>
-          <a:fontRef idx="minor">
-            <a:schemeClr val="tx1"/>
-          </a:fontRef>
-        </p:style>
-      </p:cxnSp>
-      <p:cxnSp>
-        <p:nvCxnSpPr>
-          <p:cNvPr id="24" name="Straight Connector 23">
-            <a:extLst>
-              <a:ext uri="{FF2B5EF4-FFF2-40B4-BE49-F238E27FC236}">
-                <a16:creationId xmlns:a16="http://schemas.microsoft.com/office/drawing/2014/main" id="{B5FA9BAB-9618-F442-A4EC-891A239424D6}"/>
-              </a:ext>
-            </a:extLst>
-          </p:cNvPr>
-          <p:cNvCxnSpPr>
-            <a:cxnSpLocks/>
-          </p:cNvCxnSpPr>
-          <p:nvPr/>
-        </p:nvCxnSpPr>
-        <p:spPr>
-          <a:xfrm>
-            <a:off x="3566472" y="3414069"/>
-            <a:ext cx="0" cy="1306971"/>
-          </a:xfrm>
-          <a:prstGeom prst="line">
-            <a:avLst/>
-          </a:prstGeom>
-          <a:ln w="31750"/>
-        </p:spPr>
-        <p:style>
-          <a:lnRef idx="1">
-            <a:schemeClr val="accent1"/>
-          </a:lnRef>
-          <a:fillRef idx="0">
-            <a:schemeClr val="accent1"/>
-          </a:fillRef>
-          <a:effectRef idx="0">
-            <a:schemeClr val="accent1"/>
-          </a:effectRef>
-          <a:fontRef idx="minor">
-            <a:schemeClr val="tx1"/>
-          </a:fontRef>
-        </p:style>
-      </p:cxnSp>
-      <p:cxnSp>
-        <p:nvCxnSpPr>
-          <p:cNvPr id="31" name="Straight Connector 30">
-            <a:extLst>
-              <a:ext uri="{FF2B5EF4-FFF2-40B4-BE49-F238E27FC236}">
-                <a16:creationId xmlns:a16="http://schemas.microsoft.com/office/drawing/2014/main" id="{7D93DD7D-AAE9-644A-8E26-AB9B35A39DBF}"/>
-              </a:ext>
-            </a:extLst>
-          </p:cNvPr>
-          <p:cNvCxnSpPr>
-            <a:cxnSpLocks/>
-          </p:cNvCxnSpPr>
-          <p:nvPr/>
-        </p:nvCxnSpPr>
-        <p:spPr>
-          <a:xfrm flipH="1">
-            <a:off x="9235288" y="734265"/>
-            <a:ext cx="1250227" cy="0"/>
-          </a:xfrm>
-          <a:prstGeom prst="line">
-            <a:avLst/>
-          </a:prstGeom>
-          <a:ln w="31750"/>
-        </p:spPr>
-        <p:style>
-          <a:lnRef idx="1">
-            <a:schemeClr val="accent1"/>
-          </a:lnRef>
-          <a:fillRef idx="0">
-            <a:schemeClr val="accent1"/>
-          </a:fillRef>
-          <a:effectRef idx="0">
-            <a:schemeClr val="accent1"/>
-          </a:effectRef>
-          <a:fontRef idx="minor">
-            <a:schemeClr val="tx1"/>
-          </a:fontRef>
-        </p:style>
-      </p:cxnSp>
-      <p:cxnSp>
-        <p:nvCxnSpPr>
-          <p:cNvPr id="33" name="Straight Connector 32">
-            <a:extLst>
-              <a:ext uri="{FF2B5EF4-FFF2-40B4-BE49-F238E27FC236}">
-                <a16:creationId xmlns:a16="http://schemas.microsoft.com/office/drawing/2014/main" id="{E3FDF150-B3A5-834E-A96F-05B2351D29BC}"/>
-              </a:ext>
-            </a:extLst>
-          </p:cNvPr>
-          <p:cNvCxnSpPr>
-            <a:cxnSpLocks/>
-          </p:cNvCxnSpPr>
-          <p:nvPr/>
-        </p:nvCxnSpPr>
-        <p:spPr>
-          <a:xfrm>
-            <a:off x="4300566" y="743898"/>
-            <a:ext cx="0" cy="1312327"/>
-          </a:xfrm>
-          <a:prstGeom prst="line">
-            <a:avLst/>
-          </a:prstGeom>
-          <a:ln w="31750">
-            <a:solidFill>
-              <a:schemeClr val="accent2"/>
-            </a:solidFill>
-          </a:ln>
-        </p:spPr>
-        <p:style>
-          <a:lnRef idx="1">
-            <a:schemeClr val="accent1"/>
-          </a:lnRef>
-          <a:fillRef idx="0">
-            <a:schemeClr val="accent1"/>
-          </a:fillRef>
-          <a:effectRef idx="0">
-            <a:schemeClr val="accent1"/>
-          </a:effectRef>
-          <a:fontRef idx="minor">
-            <a:schemeClr val="tx1"/>
-          </a:fontRef>
-        </p:style>
-      </p:cxnSp>
-      <p:cxnSp>
-        <p:nvCxnSpPr>
-          <p:cNvPr id="34" name="Straight Connector 33">
-            <a:extLst>
-              <a:ext uri="{FF2B5EF4-FFF2-40B4-BE49-F238E27FC236}">
-                <a16:creationId xmlns:a16="http://schemas.microsoft.com/office/drawing/2014/main" id="{B325C1AA-413D-754C-B01D-5FE896AF95C8}"/>
-              </a:ext>
-            </a:extLst>
-          </p:cNvPr>
-          <p:cNvCxnSpPr>
-            <a:cxnSpLocks/>
-          </p:cNvCxnSpPr>
-          <p:nvPr/>
-        </p:nvCxnSpPr>
-        <p:spPr>
-          <a:xfrm>
-            <a:off x="4271683" y="2071836"/>
-            <a:ext cx="0" cy="1312327"/>
-          </a:xfrm>
-          <a:prstGeom prst="line">
-            <a:avLst/>
-          </a:prstGeom>
-          <a:ln w="31750">
-            <a:solidFill>
-              <a:schemeClr val="accent2"/>
-            </a:solidFill>
-          </a:ln>
-        </p:spPr>
-        <p:style>
-          <a:lnRef idx="1">
-            <a:schemeClr val="accent1"/>
-          </a:lnRef>
-          <a:fillRef idx="0">
-            <a:schemeClr val="accent1"/>
-          </a:fillRef>
-          <a:effectRef idx="0">
-            <a:schemeClr val="accent1"/>
-          </a:effectRef>
-          <a:fontRef idx="minor">
-            <a:schemeClr val="tx1"/>
-          </a:fontRef>
-        </p:style>
-      </p:cxnSp>
-      <p:cxnSp>
-        <p:nvCxnSpPr>
-          <p:cNvPr id="35" name="Straight Connector 34">
-            <a:extLst>
-              <a:ext uri="{FF2B5EF4-FFF2-40B4-BE49-F238E27FC236}">
-                <a16:creationId xmlns:a16="http://schemas.microsoft.com/office/drawing/2014/main" id="{A9E16D5C-C4EB-D642-B07A-1C0DD9734DC9}"/>
-              </a:ext>
-            </a:extLst>
-          </p:cNvPr>
-          <p:cNvCxnSpPr>
-            <a:cxnSpLocks/>
-          </p:cNvCxnSpPr>
-          <p:nvPr/>
-        </p:nvCxnSpPr>
-        <p:spPr>
-          <a:xfrm>
-            <a:off x="3901323" y="2056225"/>
-            <a:ext cx="0" cy="1312327"/>
-          </a:xfrm>
-          <a:prstGeom prst="line">
-            <a:avLst/>
-          </a:prstGeom>
-          <a:ln w="31750"/>
-        </p:spPr>
-        <p:style>
-          <a:lnRef idx="1">
-            <a:schemeClr val="accent1"/>
-          </a:lnRef>
-          <a:fillRef idx="0">
-            <a:schemeClr val="accent1"/>
-          </a:fillRef>
-          <a:effectRef idx="0">
-            <a:schemeClr val="accent1"/>
-          </a:effectRef>
-          <a:fontRef idx="minor">
-            <a:schemeClr val="tx1"/>
-          </a:fontRef>
-        </p:style>
-      </p:cxnSp>
-      <p:cxnSp>
-        <p:nvCxnSpPr>
-          <p:cNvPr id="36" name="Straight Connector 35">
-            <a:extLst>
-              <a:ext uri="{FF2B5EF4-FFF2-40B4-BE49-F238E27FC236}">
-                <a16:creationId xmlns:a16="http://schemas.microsoft.com/office/drawing/2014/main" id="{AEEB440C-66A1-1F41-B0A8-A5F9B18F3545}"/>
-              </a:ext>
-            </a:extLst>
-          </p:cNvPr>
-          <p:cNvCxnSpPr>
-            <a:cxnSpLocks/>
-          </p:cNvCxnSpPr>
-          <p:nvPr/>
-        </p:nvCxnSpPr>
-        <p:spPr>
-          <a:xfrm>
-            <a:off x="3586957" y="3409093"/>
-            <a:ext cx="0" cy="1312327"/>
-          </a:xfrm>
-          <a:prstGeom prst="line">
-            <a:avLst/>
-          </a:prstGeom>
-          <a:ln w="31750">
-            <a:solidFill>
-              <a:schemeClr val="accent2"/>
-            </a:solidFill>
-          </a:ln>
-        </p:spPr>
-        <p:style>
-          <a:lnRef idx="1">
-            <a:schemeClr val="accent1"/>
-          </a:lnRef>
-          <a:fillRef idx="0">
-            <a:schemeClr val="accent1"/>
-          </a:fillRef>
-          <a:effectRef idx="0">
-            <a:schemeClr val="accent1"/>
-          </a:effectRef>
-          <a:fontRef idx="minor">
-            <a:schemeClr val="tx1"/>
-          </a:fontRef>
-        </p:style>
-      </p:cxnSp>
-      <p:cxnSp>
-        <p:nvCxnSpPr>
-          <p:cNvPr id="37" name="Straight Connector 36">
-            <a:extLst>
-              <a:ext uri="{FF2B5EF4-FFF2-40B4-BE49-F238E27FC236}">
-                <a16:creationId xmlns:a16="http://schemas.microsoft.com/office/drawing/2014/main" id="{EA76D23A-08F2-4347-A4EB-A59853CE94B0}"/>
-              </a:ext>
-            </a:extLst>
-          </p:cNvPr>
-          <p:cNvCxnSpPr>
-            <a:cxnSpLocks/>
-          </p:cNvCxnSpPr>
-          <p:nvPr/>
-        </p:nvCxnSpPr>
-        <p:spPr>
-          <a:xfrm>
-            <a:off x="6446067" y="721386"/>
-            <a:ext cx="1332773" cy="0"/>
-          </a:xfrm>
-          <a:prstGeom prst="line">
-            <a:avLst/>
-          </a:prstGeom>
-          <a:ln w="31750">
-            <a:solidFill>
-              <a:schemeClr val="accent2"/>
-            </a:solidFill>
-          </a:ln>
-        </p:spPr>
-        <p:style>
-          <a:lnRef idx="1">
-            <a:schemeClr val="accent1"/>
-          </a:lnRef>
-          <a:fillRef idx="0">
-            <a:schemeClr val="accent1"/>
-          </a:fillRef>
-          <a:effectRef idx="0">
-            <a:schemeClr val="accent1"/>
-          </a:effectRef>
-          <a:fontRef idx="minor">
-            <a:schemeClr val="tx1"/>
-          </a:fontRef>
-        </p:style>
-      </p:cxnSp>
-    </p:spTree>
-    <p:extLst>
-      <p:ext uri="{BB962C8B-B14F-4D97-AF65-F5344CB8AC3E}">
-        <p14:creationId xmlns:p14="http://schemas.microsoft.com/office/powerpoint/2010/main" val="4097390182"/>
-      </p:ext>
-    </p:extLst>
-  </p:cSld>
-  <p:clrMapOvr>
-    <a:masterClrMapping/>
-  </p:clrMapOvr>
-</p:sld>
-</file>
-
-<file path=ppt/slides/slide3.xml><?xml version="1.0" encoding="utf-8"?>
 <p:sld xmlns:a="http://schemas.openxmlformats.org/drawingml/2006/main" xmlns:r="http://schemas.openxmlformats.org/officeDocument/2006/relationships" xmlns:p="http://schemas.openxmlformats.org/presentationml/2006/main">
   <p:cSld>
     <p:spTree>
@@ -6557,6 +5237,1237 @@
 </p:sld>
 </file>
 
+<file path=ppt/slides/slide2.xml><?xml version="1.0" encoding="utf-8"?>
+<p:sld xmlns:a="http://schemas.openxmlformats.org/drawingml/2006/main" xmlns:r="http://schemas.openxmlformats.org/officeDocument/2006/relationships" xmlns:p="http://schemas.openxmlformats.org/presentationml/2006/main">
+  <p:cSld>
+    <p:spTree>
+      <p:nvGrpSpPr>
+        <p:cNvPr id="1" name=""/>
+        <p:cNvGrpSpPr/>
+        <p:nvPr/>
+      </p:nvGrpSpPr>
+      <p:grpSpPr>
+        <a:xfrm>
+          <a:off x="0" y="0"/>
+          <a:ext cx="0" cy="0"/>
+          <a:chOff x="0" y="0"/>
+          <a:chExt cx="0" cy="0"/>
+        </a:xfrm>
+      </p:grpSpPr>
+      <p:pic>
+        <p:nvPicPr>
+          <p:cNvPr id="4" name="Picture 3">
+            <a:extLst>
+              <a:ext uri="{FF2B5EF4-FFF2-40B4-BE49-F238E27FC236}">
+                <a16:creationId xmlns:a16="http://schemas.microsoft.com/office/drawing/2014/main" id="{15DD2D88-C847-F642-8820-A3C632BD4E4F}"/>
+              </a:ext>
+            </a:extLst>
+          </p:cNvPr>
+          <p:cNvPicPr>
+            <a:picLocks noChangeAspect="1"/>
+          </p:cNvPicPr>
+          <p:nvPr/>
+        </p:nvPicPr>
+        <p:blipFill>
+          <a:blip r:embed="rId2"/>
+          <a:stretch>
+            <a:fillRect/>
+          </a:stretch>
+        </p:blipFill>
+        <p:spPr>
+          <a:xfrm>
+            <a:off x="613335" y="2251051"/>
+            <a:ext cx="2502099" cy="938287"/>
+          </a:xfrm>
+          <a:prstGeom prst="rect">
+            <a:avLst/>
+          </a:prstGeom>
+        </p:spPr>
+      </p:pic>
+      <p:pic>
+        <p:nvPicPr>
+          <p:cNvPr id="5" name="Picture 4">
+            <a:extLst>
+              <a:ext uri="{FF2B5EF4-FFF2-40B4-BE49-F238E27FC236}">
+                <a16:creationId xmlns:a16="http://schemas.microsoft.com/office/drawing/2014/main" id="{CD280D81-DF66-4A49-A808-0820824C6A39}"/>
+              </a:ext>
+            </a:extLst>
+          </p:cNvPr>
+          <p:cNvPicPr>
+            <a:picLocks noChangeAspect="1"/>
+          </p:cNvPicPr>
+          <p:nvPr/>
+        </p:nvPicPr>
+        <p:blipFill>
+          <a:blip r:embed="rId3"/>
+          <a:stretch>
+            <a:fillRect/>
+          </a:stretch>
+        </p:blipFill>
+        <p:spPr>
+          <a:xfrm>
+            <a:off x="613335" y="921285"/>
+            <a:ext cx="2502099" cy="938287"/>
+          </a:xfrm>
+          <a:prstGeom prst="rect">
+            <a:avLst/>
+          </a:prstGeom>
+        </p:spPr>
+      </p:pic>
+      <p:pic>
+        <p:nvPicPr>
+          <p:cNvPr id="6" name="Picture 5">
+            <a:extLst>
+              <a:ext uri="{FF2B5EF4-FFF2-40B4-BE49-F238E27FC236}">
+                <a16:creationId xmlns:a16="http://schemas.microsoft.com/office/drawing/2014/main" id="{ACFE80AA-4AA5-4F43-B539-1B37947725BC}"/>
+              </a:ext>
+            </a:extLst>
+          </p:cNvPr>
+          <p:cNvPicPr>
+            <a:picLocks noChangeAspect="1"/>
+          </p:cNvPicPr>
+          <p:nvPr/>
+        </p:nvPicPr>
+        <p:blipFill>
+          <a:blip r:embed="rId4"/>
+          <a:stretch>
+            <a:fillRect/>
+          </a:stretch>
+        </p:blipFill>
+        <p:spPr>
+          <a:xfrm>
+            <a:off x="613335" y="3534016"/>
+            <a:ext cx="2502099" cy="938287"/>
+          </a:xfrm>
+          <a:prstGeom prst="rect">
+            <a:avLst/>
+          </a:prstGeom>
+        </p:spPr>
+      </p:pic>
+      <p:pic>
+        <p:nvPicPr>
+          <p:cNvPr id="7" name="Picture 6">
+            <a:extLst>
+              <a:ext uri="{FF2B5EF4-FFF2-40B4-BE49-F238E27FC236}">
+                <a16:creationId xmlns:a16="http://schemas.microsoft.com/office/drawing/2014/main" id="{B312950F-30F8-8342-819B-3439D959D889}"/>
+              </a:ext>
+            </a:extLst>
+          </p:cNvPr>
+          <p:cNvPicPr>
+            <a:picLocks noChangeAspect="1"/>
+          </p:cNvPicPr>
+          <p:nvPr/>
+        </p:nvPicPr>
+        <p:blipFill rotWithShape="1">
+          <a:blip r:embed="rId5"/>
+          <a:srcRect b="30047"/>
+          <a:stretch/>
+        </p:blipFill>
+        <p:spPr>
+          <a:xfrm>
+            <a:off x="3347923" y="734265"/>
+            <a:ext cx="2287838" cy="1312327"/>
+          </a:xfrm>
+          <a:prstGeom prst="rect">
+            <a:avLst/>
+          </a:prstGeom>
+        </p:spPr>
+      </p:pic>
+      <p:pic>
+        <p:nvPicPr>
+          <p:cNvPr id="8" name="Picture 7">
+            <a:extLst>
+              <a:ext uri="{FF2B5EF4-FFF2-40B4-BE49-F238E27FC236}">
+                <a16:creationId xmlns:a16="http://schemas.microsoft.com/office/drawing/2014/main" id="{1D45D401-86BF-5644-8C9C-4FB58FD2DA42}"/>
+              </a:ext>
+            </a:extLst>
+          </p:cNvPr>
+          <p:cNvPicPr>
+            <a:picLocks noChangeAspect="1"/>
+          </p:cNvPicPr>
+          <p:nvPr/>
+        </p:nvPicPr>
+        <p:blipFill rotWithShape="1">
+          <a:blip r:embed="rId6"/>
+          <a:srcRect b="29216"/>
+          <a:stretch/>
+        </p:blipFill>
+        <p:spPr>
+          <a:xfrm>
+            <a:off x="3347923" y="2056225"/>
+            <a:ext cx="2287838" cy="1327938"/>
+          </a:xfrm>
+          <a:prstGeom prst="rect">
+            <a:avLst/>
+          </a:prstGeom>
+        </p:spPr>
+      </p:pic>
+      <p:pic>
+        <p:nvPicPr>
+          <p:cNvPr id="9" name="Picture 8">
+            <a:extLst>
+              <a:ext uri="{FF2B5EF4-FFF2-40B4-BE49-F238E27FC236}">
+                <a16:creationId xmlns:a16="http://schemas.microsoft.com/office/drawing/2014/main" id="{7260EFD8-F196-654E-A935-703FEDA77D03}"/>
+              </a:ext>
+            </a:extLst>
+          </p:cNvPr>
+          <p:cNvPicPr>
+            <a:picLocks noChangeAspect="1"/>
+          </p:cNvPicPr>
+          <p:nvPr/>
+        </p:nvPicPr>
+        <p:blipFill rotWithShape="1">
+          <a:blip r:embed="rId7"/>
+          <a:srcRect b="30333"/>
+          <a:stretch/>
+        </p:blipFill>
+        <p:spPr>
+          <a:xfrm>
+            <a:off x="3347924" y="3414069"/>
+            <a:ext cx="2287837" cy="1306971"/>
+          </a:xfrm>
+          <a:prstGeom prst="rect">
+            <a:avLst/>
+          </a:prstGeom>
+        </p:spPr>
+      </p:pic>
+      <p:sp>
+        <p:nvSpPr>
+          <p:cNvPr id="11" name="Rectangle 10">
+            <a:extLst>
+              <a:ext uri="{FF2B5EF4-FFF2-40B4-BE49-F238E27FC236}">
+                <a16:creationId xmlns:a16="http://schemas.microsoft.com/office/drawing/2014/main" id="{E552DB2A-8498-7641-8278-94712E00FC7F}"/>
+              </a:ext>
+            </a:extLst>
+          </p:cNvPr>
+          <p:cNvSpPr/>
+          <p:nvPr/>
+        </p:nvSpPr>
+        <p:spPr>
+          <a:xfrm>
+            <a:off x="5801133" y="5451377"/>
+            <a:ext cx="1360834" cy="3000821"/>
+          </a:xfrm>
+          <a:prstGeom prst="rect">
+            <a:avLst/>
+          </a:prstGeom>
+        </p:spPr>
+        <p:txBody>
+          <a:bodyPr wrap="square">
+            <a:spAutoFit/>
+          </a:bodyPr>
+          <a:lstStyle/>
+          <a:p>
+            <a:r>
+              <a:rPr lang="de-DE" sz="1050" dirty="0"/>
+              <a:t>xy_8bit__two_bright</a:t>
+            </a:r>
+          </a:p>
+          <a:p>
+            <a:r>
+              <a:rPr lang="de-DE" sz="1050" dirty="0"/>
+              <a:t>Default: 103</a:t>
+            </a:r>
+          </a:p>
+          <a:p>
+            <a:r>
+              <a:rPr lang="de-DE" sz="1050" b="1" dirty="0"/>
+              <a:t>Huang: 81</a:t>
+            </a:r>
+          </a:p>
+          <a:p>
+            <a:r>
+              <a:rPr lang="de-DE" sz="1050" dirty="0"/>
+              <a:t>Huang2: 86</a:t>
+            </a:r>
+          </a:p>
+          <a:p>
+            <a:r>
+              <a:rPr lang="de-DE" sz="1050" dirty="0" err="1"/>
+              <a:t>Intermodes</a:t>
+            </a:r>
+            <a:r>
+              <a:rPr lang="de-DE" sz="1050" dirty="0"/>
+              <a:t>: 110</a:t>
+            </a:r>
+          </a:p>
+          <a:p>
+            <a:r>
+              <a:rPr lang="de-DE" sz="1050" dirty="0" err="1"/>
+              <a:t>IsoData</a:t>
+            </a:r>
+            <a:r>
+              <a:rPr lang="de-DE" sz="1050" dirty="0"/>
+              <a:t>: 103</a:t>
+            </a:r>
+          </a:p>
+          <a:p>
+            <a:r>
+              <a:rPr lang="de-DE" sz="1050" dirty="0"/>
+              <a:t>Li: 64</a:t>
+            </a:r>
+          </a:p>
+          <a:p>
+            <a:r>
+              <a:rPr lang="de-DE" sz="1050" dirty="0" err="1"/>
+              <a:t>MaxEntropy</a:t>
+            </a:r>
+            <a:r>
+              <a:rPr lang="de-DE" sz="1050" dirty="0"/>
+              <a:t>: 49</a:t>
+            </a:r>
+          </a:p>
+          <a:p>
+            <a:r>
+              <a:rPr lang="de-DE" sz="1050" dirty="0" err="1"/>
+              <a:t>Mean</a:t>
+            </a:r>
+            <a:r>
+              <a:rPr lang="de-DE" sz="1050" dirty="0"/>
+              <a:t>: 62</a:t>
+            </a:r>
+          </a:p>
+          <a:p>
+            <a:r>
+              <a:rPr lang="de-DE" sz="1050" dirty="0" err="1"/>
+              <a:t>MinError</a:t>
+            </a:r>
+            <a:r>
+              <a:rPr lang="de-DE" sz="1050" dirty="0"/>
+              <a:t>(I): 23</a:t>
+            </a:r>
+          </a:p>
+          <a:p>
+            <a:r>
+              <a:rPr lang="de-DE" sz="1050" dirty="0"/>
+              <a:t>Minimum: 111</a:t>
+            </a:r>
+          </a:p>
+          <a:p>
+            <a:r>
+              <a:rPr lang="de-DE" sz="1050" dirty="0"/>
+              <a:t>Moments: 103</a:t>
+            </a:r>
+          </a:p>
+          <a:p>
+            <a:r>
+              <a:rPr lang="de-DE" sz="1050" b="1" dirty="0"/>
+              <a:t>Otsu: 103</a:t>
+            </a:r>
+          </a:p>
+          <a:p>
+            <a:r>
+              <a:rPr lang="de-DE" sz="1050" dirty="0" err="1"/>
+              <a:t>Percentile</a:t>
+            </a:r>
+            <a:r>
+              <a:rPr lang="de-DE" sz="1050" dirty="0"/>
+              <a:t>: 14</a:t>
+            </a:r>
+          </a:p>
+          <a:p>
+            <a:r>
+              <a:rPr lang="de-DE" sz="1050" dirty="0" err="1"/>
+              <a:t>RenyiEntropy</a:t>
+            </a:r>
+            <a:r>
+              <a:rPr lang="de-DE" sz="1050" dirty="0"/>
+              <a:t>: 45</a:t>
+            </a:r>
+          </a:p>
+          <a:p>
+            <a:r>
+              <a:rPr lang="de-DE" sz="1050" dirty="0" err="1"/>
+              <a:t>Shanbhag</a:t>
+            </a:r>
+            <a:r>
+              <a:rPr lang="de-DE" sz="1050" dirty="0"/>
+              <a:t>: 169</a:t>
+            </a:r>
+          </a:p>
+          <a:p>
+            <a:r>
+              <a:rPr lang="de-DE" sz="1050" dirty="0" err="1"/>
+              <a:t>Triangle</a:t>
+            </a:r>
+            <a:r>
+              <a:rPr lang="de-DE" sz="1050" dirty="0"/>
+              <a:t>: 30</a:t>
+            </a:r>
+          </a:p>
+          <a:p>
+            <a:r>
+              <a:rPr lang="de-DE" sz="1050" dirty="0"/>
+              <a:t>Yen: 23</a:t>
+            </a:r>
+          </a:p>
+        </p:txBody>
+      </p:sp>
+      <p:sp>
+        <p:nvSpPr>
+          <p:cNvPr id="12" name="Rectangle 11">
+            <a:extLst>
+              <a:ext uri="{FF2B5EF4-FFF2-40B4-BE49-F238E27FC236}">
+                <a16:creationId xmlns:a16="http://schemas.microsoft.com/office/drawing/2014/main" id="{E2107B69-0801-8442-82D0-1923A6122041}"/>
+              </a:ext>
+            </a:extLst>
+          </p:cNvPr>
+          <p:cNvSpPr/>
+          <p:nvPr/>
+        </p:nvSpPr>
+        <p:spPr>
+          <a:xfrm>
+            <a:off x="8931957" y="5451377"/>
+            <a:ext cx="1592195" cy="3000821"/>
+          </a:xfrm>
+          <a:prstGeom prst="rect">
+            <a:avLst/>
+          </a:prstGeom>
+        </p:spPr>
+        <p:txBody>
+          <a:bodyPr wrap="square">
+            <a:spAutoFit/>
+          </a:bodyPr>
+          <a:lstStyle/>
+          <a:p>
+            <a:r>
+              <a:rPr lang="de-DE" sz="1050" dirty="0"/>
+              <a:t>xy_8bit__just_noise</a:t>
+            </a:r>
+          </a:p>
+          <a:p>
+            <a:r>
+              <a:rPr lang="de-DE" sz="1050" dirty="0"/>
+              <a:t>Default: 9</a:t>
+            </a:r>
+          </a:p>
+          <a:p>
+            <a:r>
+              <a:rPr lang="de-DE" sz="1050" b="1" dirty="0"/>
+              <a:t>Huang: 9</a:t>
+            </a:r>
+          </a:p>
+          <a:p>
+            <a:r>
+              <a:rPr lang="de-DE" sz="1050" dirty="0"/>
+              <a:t>Huang2: 10</a:t>
+            </a:r>
+          </a:p>
+          <a:p>
+            <a:r>
+              <a:rPr lang="de-DE" sz="1050" dirty="0" err="1"/>
+              <a:t>Intermodes</a:t>
+            </a:r>
+            <a:r>
+              <a:rPr lang="de-DE" sz="1050" dirty="0"/>
+              <a:t>: 20</a:t>
+            </a:r>
+          </a:p>
+          <a:p>
+            <a:r>
+              <a:rPr lang="de-DE" sz="1050" dirty="0" err="1"/>
+              <a:t>IsoData</a:t>
+            </a:r>
+            <a:r>
+              <a:rPr lang="de-DE" sz="1050" dirty="0"/>
+              <a:t>: 9</a:t>
+            </a:r>
+          </a:p>
+          <a:p>
+            <a:r>
+              <a:rPr lang="de-DE" sz="1050" dirty="0"/>
+              <a:t>Li: 10</a:t>
+            </a:r>
+          </a:p>
+          <a:p>
+            <a:r>
+              <a:rPr lang="de-DE" sz="1050" dirty="0" err="1"/>
+              <a:t>MaxEntropy</a:t>
+            </a:r>
+            <a:r>
+              <a:rPr lang="de-DE" sz="1050" dirty="0"/>
+              <a:t>: 15</a:t>
+            </a:r>
+          </a:p>
+          <a:p>
+            <a:r>
+              <a:rPr lang="de-DE" sz="1050" dirty="0" err="1"/>
+              <a:t>Mean</a:t>
+            </a:r>
+            <a:r>
+              <a:rPr lang="de-DE" sz="1050" dirty="0"/>
+              <a:t>: 10</a:t>
+            </a:r>
+          </a:p>
+          <a:p>
+            <a:r>
+              <a:rPr lang="de-DE" sz="1050" dirty="0" err="1"/>
+              <a:t>MinError</a:t>
+            </a:r>
+            <a:r>
+              <a:rPr lang="de-DE" sz="1050" dirty="0"/>
+              <a:t>(I): 10</a:t>
+            </a:r>
+          </a:p>
+          <a:p>
+            <a:r>
+              <a:rPr lang="de-DE" sz="1050" dirty="0"/>
+              <a:t>Minimum: 28</a:t>
+            </a:r>
+          </a:p>
+          <a:p>
+            <a:r>
+              <a:rPr lang="de-DE" sz="1050" dirty="0"/>
+              <a:t>Moments: 11</a:t>
+            </a:r>
+          </a:p>
+          <a:p>
+            <a:r>
+              <a:rPr lang="de-DE" sz="1050" b="1" dirty="0"/>
+              <a:t>Otsu: 10</a:t>
+            </a:r>
+          </a:p>
+          <a:p>
+            <a:r>
+              <a:rPr lang="de-DE" sz="1050" dirty="0" err="1"/>
+              <a:t>Percentile</a:t>
+            </a:r>
+            <a:r>
+              <a:rPr lang="de-DE" sz="1050" dirty="0"/>
+              <a:t>: 10</a:t>
+            </a:r>
+          </a:p>
+          <a:p>
+            <a:r>
+              <a:rPr lang="de-DE" sz="1050" dirty="0" err="1"/>
+              <a:t>RenyiEntropy</a:t>
+            </a:r>
+            <a:r>
+              <a:rPr lang="de-DE" sz="1050" dirty="0"/>
+              <a:t>: 15</a:t>
+            </a:r>
+          </a:p>
+          <a:p>
+            <a:r>
+              <a:rPr lang="de-DE" sz="1050" dirty="0" err="1"/>
+              <a:t>Shanbhag</a:t>
+            </a:r>
+            <a:r>
+              <a:rPr lang="de-DE" sz="1050" dirty="0"/>
+              <a:t>: 10</a:t>
+            </a:r>
+          </a:p>
+          <a:p>
+            <a:r>
+              <a:rPr lang="de-DE" sz="1050" dirty="0" err="1"/>
+              <a:t>Triangle</a:t>
+            </a:r>
+            <a:r>
+              <a:rPr lang="de-DE" sz="1050" dirty="0"/>
+              <a:t>: 21</a:t>
+            </a:r>
+          </a:p>
+          <a:p>
+            <a:r>
+              <a:rPr lang="de-DE" sz="1050" dirty="0"/>
+              <a:t>Yen: 15</a:t>
+            </a:r>
+          </a:p>
+        </p:txBody>
+      </p:sp>
+      <p:sp>
+        <p:nvSpPr>
+          <p:cNvPr id="13" name="Rectangle 12">
+            <a:extLst>
+              <a:ext uri="{FF2B5EF4-FFF2-40B4-BE49-F238E27FC236}">
+                <a16:creationId xmlns:a16="http://schemas.microsoft.com/office/drawing/2014/main" id="{A451AAC5-E118-2846-B256-A9A6FCCB849A}"/>
+              </a:ext>
+            </a:extLst>
+          </p:cNvPr>
+          <p:cNvSpPr/>
+          <p:nvPr/>
+        </p:nvSpPr>
+        <p:spPr>
+          <a:xfrm>
+            <a:off x="7161967" y="5451377"/>
+            <a:ext cx="2001351" cy="3000821"/>
+          </a:xfrm>
+          <a:prstGeom prst="rect">
+            <a:avLst/>
+          </a:prstGeom>
+        </p:spPr>
+        <p:txBody>
+          <a:bodyPr wrap="square">
+            <a:spAutoFit/>
+          </a:bodyPr>
+          <a:lstStyle/>
+          <a:p>
+            <a:r>
+              <a:rPr lang="de-DE" sz="1050" dirty="0"/>
+              <a:t>xy_8bit__two_bright_one_dark</a:t>
+            </a:r>
+          </a:p>
+          <a:p>
+            <a:r>
+              <a:rPr lang="de-DE" sz="1050" dirty="0"/>
+              <a:t>Default: 111</a:t>
+            </a:r>
+          </a:p>
+          <a:p>
+            <a:r>
+              <a:rPr lang="de-DE" sz="1050" b="1" dirty="0"/>
+              <a:t>Huang: 55</a:t>
+            </a:r>
+          </a:p>
+          <a:p>
+            <a:r>
+              <a:rPr lang="de-DE" sz="1050" dirty="0"/>
+              <a:t>Huang2: 58</a:t>
+            </a:r>
+          </a:p>
+          <a:p>
+            <a:r>
+              <a:rPr lang="de-DE" sz="1050" dirty="0" err="1"/>
+              <a:t>Intermodes</a:t>
+            </a:r>
+            <a:r>
+              <a:rPr lang="de-DE" sz="1050" dirty="0"/>
+              <a:t>: 113</a:t>
+            </a:r>
+          </a:p>
+          <a:p>
+            <a:r>
+              <a:rPr lang="de-DE" sz="1050" dirty="0" err="1"/>
+              <a:t>IsoData</a:t>
+            </a:r>
+            <a:r>
+              <a:rPr lang="de-DE" sz="1050" dirty="0"/>
+              <a:t>: 111</a:t>
+            </a:r>
+          </a:p>
+          <a:p>
+            <a:r>
+              <a:rPr lang="de-DE" sz="1050" dirty="0"/>
+              <a:t>Li: 61</a:t>
+            </a:r>
+          </a:p>
+          <a:p>
+            <a:r>
+              <a:rPr lang="de-DE" sz="1050" dirty="0" err="1"/>
+              <a:t>MaxEntropy</a:t>
+            </a:r>
+            <a:r>
+              <a:rPr lang="de-DE" sz="1050" dirty="0"/>
+              <a:t>: 90</a:t>
+            </a:r>
+          </a:p>
+          <a:p>
+            <a:r>
+              <a:rPr lang="de-DE" sz="1050" dirty="0" err="1"/>
+              <a:t>Mean</a:t>
+            </a:r>
+            <a:r>
+              <a:rPr lang="de-DE" sz="1050" dirty="0"/>
+              <a:t>: 72</a:t>
+            </a:r>
+          </a:p>
+          <a:p>
+            <a:r>
+              <a:rPr lang="de-DE" sz="1050" dirty="0" err="1"/>
+              <a:t>MinError</a:t>
+            </a:r>
+            <a:r>
+              <a:rPr lang="de-DE" sz="1050" dirty="0"/>
+              <a:t>(I): 21</a:t>
+            </a:r>
+          </a:p>
+          <a:p>
+            <a:r>
+              <a:rPr lang="de-DE" sz="1050" dirty="0"/>
+              <a:t>Minimum: 140</a:t>
+            </a:r>
+          </a:p>
+          <a:p>
+            <a:r>
+              <a:rPr lang="de-DE" sz="1050" dirty="0"/>
+              <a:t>Moments: 88</a:t>
+            </a:r>
+          </a:p>
+          <a:p>
+            <a:r>
+              <a:rPr lang="de-DE" sz="1050" b="1" dirty="0"/>
+              <a:t>Otsu: 111</a:t>
+            </a:r>
+          </a:p>
+          <a:p>
+            <a:r>
+              <a:rPr lang="de-DE" sz="1050" dirty="0" err="1"/>
+              <a:t>Percentile</a:t>
+            </a:r>
+            <a:r>
+              <a:rPr lang="de-DE" sz="1050" dirty="0"/>
+              <a:t>: 30</a:t>
+            </a:r>
+          </a:p>
+          <a:p>
+            <a:r>
+              <a:rPr lang="de-DE" sz="1050" dirty="0" err="1"/>
+              <a:t>RenyiEntropy</a:t>
+            </a:r>
+            <a:r>
+              <a:rPr lang="de-DE" sz="1050" dirty="0"/>
+              <a:t>: 60</a:t>
+            </a:r>
+          </a:p>
+          <a:p>
+            <a:r>
+              <a:rPr lang="de-DE" sz="1050" dirty="0" err="1"/>
+              <a:t>Shanbhag</a:t>
+            </a:r>
+            <a:r>
+              <a:rPr lang="de-DE" sz="1050" dirty="0"/>
+              <a:t>: 110</a:t>
+            </a:r>
+          </a:p>
+          <a:p>
+            <a:r>
+              <a:rPr lang="de-DE" sz="1050" dirty="0" err="1"/>
+              <a:t>Triangle</a:t>
+            </a:r>
+            <a:r>
+              <a:rPr lang="de-DE" sz="1050" dirty="0"/>
+              <a:t>: 29</a:t>
+            </a:r>
+          </a:p>
+          <a:p>
+            <a:r>
+              <a:rPr lang="de-DE" sz="1050" dirty="0"/>
+              <a:t>Yen: 45</a:t>
+            </a:r>
+          </a:p>
+        </p:txBody>
+      </p:sp>
+      <p:pic>
+        <p:nvPicPr>
+          <p:cNvPr id="15" name="Picture 14">
+            <a:extLst>
+              <a:ext uri="{FF2B5EF4-FFF2-40B4-BE49-F238E27FC236}">
+                <a16:creationId xmlns:a16="http://schemas.microsoft.com/office/drawing/2014/main" id="{65C659A7-583D-C04A-9FD5-D9D56E6A9261}"/>
+              </a:ext>
+            </a:extLst>
+          </p:cNvPr>
+          <p:cNvPicPr>
+            <a:picLocks noChangeAspect="1"/>
+          </p:cNvPicPr>
+          <p:nvPr/>
+        </p:nvPicPr>
+        <p:blipFill>
+          <a:blip r:embed="rId8"/>
+          <a:stretch>
+            <a:fillRect/>
+          </a:stretch>
+        </p:blipFill>
+        <p:spPr>
+          <a:xfrm>
+            <a:off x="5809873" y="3503429"/>
+            <a:ext cx="2626283" cy="984856"/>
+          </a:xfrm>
+          <a:prstGeom prst="rect">
+            <a:avLst/>
+          </a:prstGeom>
+        </p:spPr>
+      </p:pic>
+      <p:pic>
+        <p:nvPicPr>
+          <p:cNvPr id="16" name="Picture 15">
+            <a:extLst>
+              <a:ext uri="{FF2B5EF4-FFF2-40B4-BE49-F238E27FC236}">
+                <a16:creationId xmlns:a16="http://schemas.microsoft.com/office/drawing/2014/main" id="{EF3B66AD-3B79-6747-81E2-7AE807D3BCF6}"/>
+              </a:ext>
+            </a:extLst>
+          </p:cNvPr>
+          <p:cNvPicPr>
+            <a:picLocks noChangeAspect="1"/>
+          </p:cNvPicPr>
+          <p:nvPr/>
+        </p:nvPicPr>
+        <p:blipFill>
+          <a:blip r:embed="rId9"/>
+          <a:stretch>
+            <a:fillRect/>
+          </a:stretch>
+        </p:blipFill>
+        <p:spPr>
+          <a:xfrm>
+            <a:off x="8573479" y="3514138"/>
+            <a:ext cx="2608114" cy="978043"/>
+          </a:xfrm>
+          <a:prstGeom prst="rect">
+            <a:avLst/>
+          </a:prstGeom>
+        </p:spPr>
+      </p:pic>
+      <p:pic>
+        <p:nvPicPr>
+          <p:cNvPr id="17" name="Picture 16">
+            <a:extLst>
+              <a:ext uri="{FF2B5EF4-FFF2-40B4-BE49-F238E27FC236}">
+                <a16:creationId xmlns:a16="http://schemas.microsoft.com/office/drawing/2014/main" id="{603AE2B9-DDD4-D940-80C9-1786CD7D57A2}"/>
+              </a:ext>
+            </a:extLst>
+          </p:cNvPr>
+          <p:cNvPicPr>
+            <a:picLocks noChangeAspect="1"/>
+          </p:cNvPicPr>
+          <p:nvPr/>
+        </p:nvPicPr>
+        <p:blipFill>
+          <a:blip r:embed="rId10"/>
+          <a:stretch>
+            <a:fillRect/>
+          </a:stretch>
+        </p:blipFill>
+        <p:spPr>
+          <a:xfrm>
+            <a:off x="5809873" y="898000"/>
+            <a:ext cx="2626283" cy="984856"/>
+          </a:xfrm>
+          <a:prstGeom prst="rect">
+            <a:avLst/>
+          </a:prstGeom>
+        </p:spPr>
+      </p:pic>
+      <p:pic>
+        <p:nvPicPr>
+          <p:cNvPr id="18" name="Picture 17">
+            <a:extLst>
+              <a:ext uri="{FF2B5EF4-FFF2-40B4-BE49-F238E27FC236}">
+                <a16:creationId xmlns:a16="http://schemas.microsoft.com/office/drawing/2014/main" id="{1EB7C462-FC3B-C545-9592-4156DD351191}"/>
+              </a:ext>
+            </a:extLst>
+          </p:cNvPr>
+          <p:cNvPicPr>
+            <a:picLocks noChangeAspect="1"/>
+          </p:cNvPicPr>
+          <p:nvPr/>
+        </p:nvPicPr>
+        <p:blipFill>
+          <a:blip r:embed="rId11"/>
+          <a:stretch>
+            <a:fillRect/>
+          </a:stretch>
+        </p:blipFill>
+        <p:spPr>
+          <a:xfrm>
+            <a:off x="8573479" y="898000"/>
+            <a:ext cx="2626283" cy="984856"/>
+          </a:xfrm>
+          <a:prstGeom prst="rect">
+            <a:avLst/>
+          </a:prstGeom>
+        </p:spPr>
+      </p:pic>
+      <p:pic>
+        <p:nvPicPr>
+          <p:cNvPr id="19" name="Picture 18">
+            <a:extLst>
+              <a:ext uri="{FF2B5EF4-FFF2-40B4-BE49-F238E27FC236}">
+                <a16:creationId xmlns:a16="http://schemas.microsoft.com/office/drawing/2014/main" id="{411F920C-8498-224A-A2B3-24F8FBF9A054}"/>
+              </a:ext>
+            </a:extLst>
+          </p:cNvPr>
+          <p:cNvPicPr>
+            <a:picLocks noChangeAspect="1"/>
+          </p:cNvPicPr>
+          <p:nvPr/>
+        </p:nvPicPr>
+        <p:blipFill>
+          <a:blip r:embed="rId12"/>
+          <a:stretch>
+            <a:fillRect/>
+          </a:stretch>
+        </p:blipFill>
+        <p:spPr>
+          <a:xfrm>
+            <a:off x="5809873" y="2227766"/>
+            <a:ext cx="2626283" cy="984856"/>
+          </a:xfrm>
+          <a:prstGeom prst="rect">
+            <a:avLst/>
+          </a:prstGeom>
+        </p:spPr>
+      </p:pic>
+      <p:pic>
+        <p:nvPicPr>
+          <p:cNvPr id="20" name="Picture 19">
+            <a:extLst>
+              <a:ext uri="{FF2B5EF4-FFF2-40B4-BE49-F238E27FC236}">
+                <a16:creationId xmlns:a16="http://schemas.microsoft.com/office/drawing/2014/main" id="{0E1A0B80-0074-A245-9BC4-F2B33C1AD887}"/>
+              </a:ext>
+            </a:extLst>
+          </p:cNvPr>
+          <p:cNvPicPr>
+            <a:picLocks noChangeAspect="1"/>
+          </p:cNvPicPr>
+          <p:nvPr/>
+        </p:nvPicPr>
+        <p:blipFill>
+          <a:blip r:embed="rId13"/>
+          <a:stretch>
+            <a:fillRect/>
+          </a:stretch>
+        </p:blipFill>
+        <p:spPr>
+          <a:xfrm>
+            <a:off x="8573479" y="2227766"/>
+            <a:ext cx="2626283" cy="984856"/>
+          </a:xfrm>
+          <a:prstGeom prst="rect">
+            <a:avLst/>
+          </a:prstGeom>
+        </p:spPr>
+      </p:pic>
+      <p:cxnSp>
+        <p:nvCxnSpPr>
+          <p:cNvPr id="22" name="Straight Connector 21">
+            <a:extLst>
+              <a:ext uri="{FF2B5EF4-FFF2-40B4-BE49-F238E27FC236}">
+                <a16:creationId xmlns:a16="http://schemas.microsoft.com/office/drawing/2014/main" id="{BAA7B587-28D0-C841-972B-AD72B5536FE9}"/>
+              </a:ext>
+            </a:extLst>
+          </p:cNvPr>
+          <p:cNvCxnSpPr>
+            <a:cxnSpLocks/>
+          </p:cNvCxnSpPr>
+          <p:nvPr/>
+        </p:nvCxnSpPr>
+        <p:spPr>
+          <a:xfrm>
+            <a:off x="4225441" y="743898"/>
+            <a:ext cx="0" cy="1312327"/>
+          </a:xfrm>
+          <a:prstGeom prst="line">
+            <a:avLst/>
+          </a:prstGeom>
+          <a:ln w="31750"/>
+        </p:spPr>
+        <p:style>
+          <a:lnRef idx="1">
+            <a:schemeClr val="accent1"/>
+          </a:lnRef>
+          <a:fillRef idx="0">
+            <a:schemeClr val="accent1"/>
+          </a:fillRef>
+          <a:effectRef idx="0">
+            <a:schemeClr val="accent1"/>
+          </a:effectRef>
+          <a:fontRef idx="minor">
+            <a:schemeClr val="tx1"/>
+          </a:fontRef>
+        </p:style>
+      </p:cxnSp>
+      <p:cxnSp>
+        <p:nvCxnSpPr>
+          <p:cNvPr id="24" name="Straight Connector 23">
+            <a:extLst>
+              <a:ext uri="{FF2B5EF4-FFF2-40B4-BE49-F238E27FC236}">
+                <a16:creationId xmlns:a16="http://schemas.microsoft.com/office/drawing/2014/main" id="{B5FA9BAB-9618-F442-A4EC-891A239424D6}"/>
+              </a:ext>
+            </a:extLst>
+          </p:cNvPr>
+          <p:cNvCxnSpPr>
+            <a:cxnSpLocks/>
+          </p:cNvCxnSpPr>
+          <p:nvPr/>
+        </p:nvCxnSpPr>
+        <p:spPr>
+          <a:xfrm>
+            <a:off x="3566472" y="3414069"/>
+            <a:ext cx="0" cy="1306971"/>
+          </a:xfrm>
+          <a:prstGeom prst="line">
+            <a:avLst/>
+          </a:prstGeom>
+          <a:ln w="31750"/>
+        </p:spPr>
+        <p:style>
+          <a:lnRef idx="1">
+            <a:schemeClr val="accent1"/>
+          </a:lnRef>
+          <a:fillRef idx="0">
+            <a:schemeClr val="accent1"/>
+          </a:fillRef>
+          <a:effectRef idx="0">
+            <a:schemeClr val="accent1"/>
+          </a:effectRef>
+          <a:fontRef idx="minor">
+            <a:schemeClr val="tx1"/>
+          </a:fontRef>
+        </p:style>
+      </p:cxnSp>
+      <p:cxnSp>
+        <p:nvCxnSpPr>
+          <p:cNvPr id="31" name="Straight Connector 30">
+            <a:extLst>
+              <a:ext uri="{FF2B5EF4-FFF2-40B4-BE49-F238E27FC236}">
+                <a16:creationId xmlns:a16="http://schemas.microsoft.com/office/drawing/2014/main" id="{7D93DD7D-AAE9-644A-8E26-AB9B35A39DBF}"/>
+              </a:ext>
+            </a:extLst>
+          </p:cNvPr>
+          <p:cNvCxnSpPr>
+            <a:cxnSpLocks/>
+          </p:cNvCxnSpPr>
+          <p:nvPr/>
+        </p:nvCxnSpPr>
+        <p:spPr>
+          <a:xfrm flipH="1">
+            <a:off x="9235288" y="734265"/>
+            <a:ext cx="1250227" cy="0"/>
+          </a:xfrm>
+          <a:prstGeom prst="line">
+            <a:avLst/>
+          </a:prstGeom>
+          <a:ln w="31750"/>
+        </p:spPr>
+        <p:style>
+          <a:lnRef idx="1">
+            <a:schemeClr val="accent1"/>
+          </a:lnRef>
+          <a:fillRef idx="0">
+            <a:schemeClr val="accent1"/>
+          </a:fillRef>
+          <a:effectRef idx="0">
+            <a:schemeClr val="accent1"/>
+          </a:effectRef>
+          <a:fontRef idx="minor">
+            <a:schemeClr val="tx1"/>
+          </a:fontRef>
+        </p:style>
+      </p:cxnSp>
+      <p:cxnSp>
+        <p:nvCxnSpPr>
+          <p:cNvPr id="33" name="Straight Connector 32">
+            <a:extLst>
+              <a:ext uri="{FF2B5EF4-FFF2-40B4-BE49-F238E27FC236}">
+                <a16:creationId xmlns:a16="http://schemas.microsoft.com/office/drawing/2014/main" id="{E3FDF150-B3A5-834E-A96F-05B2351D29BC}"/>
+              </a:ext>
+            </a:extLst>
+          </p:cNvPr>
+          <p:cNvCxnSpPr>
+            <a:cxnSpLocks/>
+          </p:cNvCxnSpPr>
+          <p:nvPr/>
+        </p:nvCxnSpPr>
+        <p:spPr>
+          <a:xfrm>
+            <a:off x="4300566" y="743898"/>
+            <a:ext cx="0" cy="1312327"/>
+          </a:xfrm>
+          <a:prstGeom prst="line">
+            <a:avLst/>
+          </a:prstGeom>
+          <a:ln w="31750">
+            <a:solidFill>
+              <a:schemeClr val="accent2"/>
+            </a:solidFill>
+          </a:ln>
+        </p:spPr>
+        <p:style>
+          <a:lnRef idx="1">
+            <a:schemeClr val="accent1"/>
+          </a:lnRef>
+          <a:fillRef idx="0">
+            <a:schemeClr val="accent1"/>
+          </a:fillRef>
+          <a:effectRef idx="0">
+            <a:schemeClr val="accent1"/>
+          </a:effectRef>
+          <a:fontRef idx="minor">
+            <a:schemeClr val="tx1"/>
+          </a:fontRef>
+        </p:style>
+      </p:cxnSp>
+      <p:cxnSp>
+        <p:nvCxnSpPr>
+          <p:cNvPr id="34" name="Straight Connector 33">
+            <a:extLst>
+              <a:ext uri="{FF2B5EF4-FFF2-40B4-BE49-F238E27FC236}">
+                <a16:creationId xmlns:a16="http://schemas.microsoft.com/office/drawing/2014/main" id="{B325C1AA-413D-754C-B01D-5FE896AF95C8}"/>
+              </a:ext>
+            </a:extLst>
+          </p:cNvPr>
+          <p:cNvCxnSpPr>
+            <a:cxnSpLocks/>
+          </p:cNvCxnSpPr>
+          <p:nvPr/>
+        </p:nvCxnSpPr>
+        <p:spPr>
+          <a:xfrm>
+            <a:off x="4271683" y="2071836"/>
+            <a:ext cx="0" cy="1312327"/>
+          </a:xfrm>
+          <a:prstGeom prst="line">
+            <a:avLst/>
+          </a:prstGeom>
+          <a:ln w="31750">
+            <a:solidFill>
+              <a:schemeClr val="accent2"/>
+            </a:solidFill>
+          </a:ln>
+        </p:spPr>
+        <p:style>
+          <a:lnRef idx="1">
+            <a:schemeClr val="accent1"/>
+          </a:lnRef>
+          <a:fillRef idx="0">
+            <a:schemeClr val="accent1"/>
+          </a:fillRef>
+          <a:effectRef idx="0">
+            <a:schemeClr val="accent1"/>
+          </a:effectRef>
+          <a:fontRef idx="minor">
+            <a:schemeClr val="tx1"/>
+          </a:fontRef>
+        </p:style>
+      </p:cxnSp>
+      <p:cxnSp>
+        <p:nvCxnSpPr>
+          <p:cNvPr id="35" name="Straight Connector 34">
+            <a:extLst>
+              <a:ext uri="{FF2B5EF4-FFF2-40B4-BE49-F238E27FC236}">
+                <a16:creationId xmlns:a16="http://schemas.microsoft.com/office/drawing/2014/main" id="{A9E16D5C-C4EB-D642-B07A-1C0DD9734DC9}"/>
+              </a:ext>
+            </a:extLst>
+          </p:cNvPr>
+          <p:cNvCxnSpPr>
+            <a:cxnSpLocks/>
+          </p:cNvCxnSpPr>
+          <p:nvPr/>
+        </p:nvCxnSpPr>
+        <p:spPr>
+          <a:xfrm>
+            <a:off x="3901323" y="2056225"/>
+            <a:ext cx="0" cy="1312327"/>
+          </a:xfrm>
+          <a:prstGeom prst="line">
+            <a:avLst/>
+          </a:prstGeom>
+          <a:ln w="31750"/>
+        </p:spPr>
+        <p:style>
+          <a:lnRef idx="1">
+            <a:schemeClr val="accent1"/>
+          </a:lnRef>
+          <a:fillRef idx="0">
+            <a:schemeClr val="accent1"/>
+          </a:fillRef>
+          <a:effectRef idx="0">
+            <a:schemeClr val="accent1"/>
+          </a:effectRef>
+          <a:fontRef idx="minor">
+            <a:schemeClr val="tx1"/>
+          </a:fontRef>
+        </p:style>
+      </p:cxnSp>
+      <p:cxnSp>
+        <p:nvCxnSpPr>
+          <p:cNvPr id="36" name="Straight Connector 35">
+            <a:extLst>
+              <a:ext uri="{FF2B5EF4-FFF2-40B4-BE49-F238E27FC236}">
+                <a16:creationId xmlns:a16="http://schemas.microsoft.com/office/drawing/2014/main" id="{AEEB440C-66A1-1F41-B0A8-A5F9B18F3545}"/>
+              </a:ext>
+            </a:extLst>
+          </p:cNvPr>
+          <p:cNvCxnSpPr>
+            <a:cxnSpLocks/>
+          </p:cNvCxnSpPr>
+          <p:nvPr/>
+        </p:nvCxnSpPr>
+        <p:spPr>
+          <a:xfrm>
+            <a:off x="3586957" y="3409093"/>
+            <a:ext cx="0" cy="1312327"/>
+          </a:xfrm>
+          <a:prstGeom prst="line">
+            <a:avLst/>
+          </a:prstGeom>
+          <a:ln w="31750">
+            <a:solidFill>
+              <a:schemeClr val="accent2"/>
+            </a:solidFill>
+          </a:ln>
+        </p:spPr>
+        <p:style>
+          <a:lnRef idx="1">
+            <a:schemeClr val="accent1"/>
+          </a:lnRef>
+          <a:fillRef idx="0">
+            <a:schemeClr val="accent1"/>
+          </a:fillRef>
+          <a:effectRef idx="0">
+            <a:schemeClr val="accent1"/>
+          </a:effectRef>
+          <a:fontRef idx="minor">
+            <a:schemeClr val="tx1"/>
+          </a:fontRef>
+        </p:style>
+      </p:cxnSp>
+      <p:cxnSp>
+        <p:nvCxnSpPr>
+          <p:cNvPr id="37" name="Straight Connector 36">
+            <a:extLst>
+              <a:ext uri="{FF2B5EF4-FFF2-40B4-BE49-F238E27FC236}">
+                <a16:creationId xmlns:a16="http://schemas.microsoft.com/office/drawing/2014/main" id="{EA76D23A-08F2-4347-A4EB-A59853CE94B0}"/>
+              </a:ext>
+            </a:extLst>
+          </p:cNvPr>
+          <p:cNvCxnSpPr>
+            <a:cxnSpLocks/>
+          </p:cNvCxnSpPr>
+          <p:nvPr/>
+        </p:nvCxnSpPr>
+        <p:spPr>
+          <a:xfrm>
+            <a:off x="6446067" y="721386"/>
+            <a:ext cx="1332773" cy="0"/>
+          </a:xfrm>
+          <a:prstGeom prst="line">
+            <a:avLst/>
+          </a:prstGeom>
+          <a:ln w="31750">
+            <a:solidFill>
+              <a:schemeClr val="accent2"/>
+            </a:solidFill>
+          </a:ln>
+        </p:spPr>
+        <p:style>
+          <a:lnRef idx="1">
+            <a:schemeClr val="accent1"/>
+          </a:lnRef>
+          <a:fillRef idx="0">
+            <a:schemeClr val="accent1"/>
+          </a:fillRef>
+          <a:effectRef idx="0">
+            <a:schemeClr val="accent1"/>
+          </a:effectRef>
+          <a:fontRef idx="minor">
+            <a:schemeClr val="tx1"/>
+          </a:fontRef>
+        </p:style>
+      </p:cxnSp>
+    </p:spTree>
+    <p:extLst>
+      <p:ext uri="{BB962C8B-B14F-4D97-AF65-F5344CB8AC3E}">
+        <p14:creationId xmlns:p14="http://schemas.microsoft.com/office/powerpoint/2010/main" val="4097390182"/>
+      </p:ext>
+    </p:extLst>
+  </p:cSld>
+  <p:clrMapOvr>
+    <a:masterClrMapping/>
+  </p:clrMapOvr>
+</p:sld>
+</file>
+
 <file path=ppt/theme/theme1.xml><?xml version="1.0" encoding="utf-8"?>
 <a:theme xmlns:a="http://schemas.openxmlformats.org/drawingml/2006/main" name="Office Theme">
   <a:themeElements>

</xml_diff>